<commit_message>
Diagrama de implementação V2
Serviços dentro de containers em uma só EC2
</commit_message>
<xml_diff>
--- a/Diagrama de Implementação.pptx
+++ b/Diagrama de Implementação.pptx
@@ -115,7 +115,7 @@
 <file path=ppt/revisionInfo.xml><?xml version="1.0" encoding="utf-8"?>
 <p1510:revInfo xmlns:a="http://schemas.openxmlformats.org/drawingml/2006/main" xmlns:r="http://schemas.openxmlformats.org/officeDocument/2006/relationships" xmlns:p1510="http://schemas.microsoft.com/office/powerpoint/2015/10/main">
   <p1510:revLst>
-    <p1510:client id="{9BE02AE9-5CA4-4349-81AC-47C2B69F5385}" v="138" dt="2025-10-22T21:10:58.513"/>
+    <p1510:client id="{9BE02AE9-5CA4-4349-81AC-47C2B69F5385}" v="203" dt="2025-10-27T02:43:23.842"/>
   </p1510:revLst>
 </p1510:revInfo>
 </file>
@@ -125,12 +125,12 @@
   <pc:docChgLst>
     <pc:chgData name="JOÃO PEDRO DE SOUZA OLIVEIRA ANTONIO ." userId="a98d014e-0402-45de-8f01-fb0aefda0265" providerId="ADAL" clId="{FDD979A8-8338-4BC8-8370-413243D4005B}"/>
     <pc:docChg chg="undo custSel modSld">
-      <pc:chgData name="JOÃO PEDRO DE SOUZA OLIVEIRA ANTONIO ." userId="a98d014e-0402-45de-8f01-fb0aefda0265" providerId="ADAL" clId="{FDD979A8-8338-4BC8-8370-413243D4005B}" dt="2025-10-22T21:13:45.345" v="1438" actId="404"/>
+      <pc:chgData name="JOÃO PEDRO DE SOUZA OLIVEIRA ANTONIO ." userId="a98d014e-0402-45de-8f01-fb0aefda0265" providerId="ADAL" clId="{FDD979A8-8338-4BC8-8370-413243D4005B}" dt="2025-10-27T02:43:23.842" v="1619" actId="1076"/>
       <pc:docMkLst>
         <pc:docMk/>
       </pc:docMkLst>
       <pc:sldChg chg="addSp delSp modSp mod">
-        <pc:chgData name="JOÃO PEDRO DE SOUZA OLIVEIRA ANTONIO ." userId="a98d014e-0402-45de-8f01-fb0aefda0265" providerId="ADAL" clId="{FDD979A8-8338-4BC8-8370-413243D4005B}" dt="2025-10-22T21:13:45.345" v="1438" actId="404"/>
+        <pc:chgData name="JOÃO PEDRO DE SOUZA OLIVEIRA ANTONIO ." userId="a98d014e-0402-45de-8f01-fb0aefda0265" providerId="ADAL" clId="{FDD979A8-8338-4BC8-8370-413243D4005B}" dt="2025-10-27T02:43:23.842" v="1619" actId="1076"/>
         <pc:sldMkLst>
           <pc:docMk/>
           <pc:sldMk cId="1246143638" sldId="256"/>
@@ -159,24 +159,24 @@
             <ac:spMk id="4" creationId="{6C5F17F5-9ACA-6F30-F581-F2203EE8BA18}"/>
           </ac:spMkLst>
         </pc:spChg>
-        <pc:spChg chg="add del mod">
-          <ac:chgData name="JOÃO PEDRO DE SOUZA OLIVEIRA ANTONIO ." userId="a98d014e-0402-45de-8f01-fb0aefda0265" providerId="ADAL" clId="{FDD979A8-8338-4BC8-8370-413243D4005B}" dt="2025-10-22T21:10:58.513" v="1391" actId="478"/>
+        <pc:spChg chg="add mod">
+          <ac:chgData name="JOÃO PEDRO DE SOUZA OLIVEIRA ANTONIO ." userId="a98d014e-0402-45de-8f01-fb0aefda0265" providerId="ADAL" clId="{FDD979A8-8338-4BC8-8370-413243D4005B}" dt="2025-10-27T02:39:33.998" v="1544" actId="14100"/>
           <ac:spMkLst>
             <pc:docMk/>
             <pc:sldMk cId="1246143638" sldId="256"/>
-            <ac:spMk id="5" creationId="{6294E24A-E672-E898-C344-3AB3836FDE3C}"/>
-          </ac:spMkLst>
-        </pc:spChg>
-        <pc:spChg chg="add del mod">
-          <ac:chgData name="JOÃO PEDRO DE SOUZA OLIVEIRA ANTONIO ." userId="a98d014e-0402-45de-8f01-fb0aefda0265" providerId="ADAL" clId="{FDD979A8-8338-4BC8-8370-413243D4005B}" dt="2025-10-22T21:10:58.513" v="1391" actId="478"/>
-          <ac:spMkLst>
-            <pc:docMk/>
-            <pc:sldMk cId="1246143638" sldId="256"/>
-            <ac:spMk id="7" creationId="{06B370DD-CFA3-D10F-9C16-C681F3FB109A}"/>
+            <ac:spMk id="5" creationId="{53A56C97-E6B3-33FD-1505-FD2927DD07BC}"/>
           </ac:spMkLst>
         </pc:spChg>
         <pc:spChg chg="add mod">
-          <ac:chgData name="JOÃO PEDRO DE SOUZA OLIVEIRA ANTONIO ." userId="a98d014e-0402-45de-8f01-fb0aefda0265" providerId="ADAL" clId="{FDD979A8-8338-4BC8-8370-413243D4005B}" dt="2025-10-18T01:39:32.753" v="695" actId="1037"/>
+          <ac:chgData name="JOÃO PEDRO DE SOUZA OLIVEIRA ANTONIO ." userId="a98d014e-0402-45de-8f01-fb0aefda0265" providerId="ADAL" clId="{FDD979A8-8338-4BC8-8370-413243D4005B}" dt="2025-10-27T02:39:26.508" v="1543" actId="1076"/>
+          <ac:spMkLst>
+            <pc:docMk/>
+            <pc:sldMk cId="1246143638" sldId="256"/>
+            <ac:spMk id="7" creationId="{BBC2839C-410F-15D7-90C1-6E7BC469F629}"/>
+          </ac:spMkLst>
+        </pc:spChg>
+        <pc:spChg chg="add mod">
+          <ac:chgData name="JOÃO PEDRO DE SOUZA OLIVEIRA ANTONIO ." userId="a98d014e-0402-45de-8f01-fb0aefda0265" providerId="ADAL" clId="{FDD979A8-8338-4BC8-8370-413243D4005B}" dt="2025-10-27T02:39:15.383" v="1542" actId="1076"/>
           <ac:spMkLst>
             <pc:docMk/>
             <pc:sldMk cId="1246143638" sldId="256"/>
@@ -192,7 +192,7 @@
           </ac:spMkLst>
         </pc:spChg>
         <pc:spChg chg="add mod">
-          <ac:chgData name="JOÃO PEDRO DE SOUZA OLIVEIRA ANTONIO ." userId="a98d014e-0402-45de-8f01-fb0aefda0265" providerId="ADAL" clId="{FDD979A8-8338-4BC8-8370-413243D4005B}" dt="2025-10-18T01:39:32.753" v="695" actId="1037"/>
+          <ac:chgData name="JOÃO PEDRO DE SOUZA OLIVEIRA ANTONIO ." userId="a98d014e-0402-45de-8f01-fb0aefda0265" providerId="ADAL" clId="{FDD979A8-8338-4BC8-8370-413243D4005B}" dt="2025-10-27T02:39:15.383" v="1542" actId="1076"/>
           <ac:spMkLst>
             <pc:docMk/>
             <pc:sldMk cId="1246143638" sldId="256"/>
@@ -215,12 +215,20 @@
             <ac:spMk id="13" creationId="{3B1D086F-AE22-7463-63B1-36E969F13172}"/>
           </ac:spMkLst>
         </pc:spChg>
-        <pc:spChg chg="add del mod">
-          <ac:chgData name="JOÃO PEDRO DE SOUZA OLIVEIRA ANTONIO ." userId="a98d014e-0402-45de-8f01-fb0aefda0265" providerId="ADAL" clId="{FDD979A8-8338-4BC8-8370-413243D4005B}" dt="2025-10-22T21:10:58.513" v="1391" actId="478"/>
+        <pc:spChg chg="add mod">
+          <ac:chgData name="JOÃO PEDRO DE SOUZA OLIVEIRA ANTONIO ." userId="a98d014e-0402-45de-8f01-fb0aefda0265" providerId="ADAL" clId="{FDD979A8-8338-4BC8-8370-413243D4005B}" dt="2025-10-27T02:41:09.580" v="1557" actId="14100"/>
           <ac:spMkLst>
             <pc:docMk/>
             <pc:sldMk cId="1246143638" sldId="256"/>
-            <ac:spMk id="14" creationId="{EE519FA8-766D-C5FC-6BCF-0BB69FF4E987}"/>
+            <ac:spMk id="14" creationId="{6CC5EB98-DD41-3396-F63E-F1A708229C1F}"/>
+          </ac:spMkLst>
+        </pc:spChg>
+        <pc:spChg chg="add mod">
+          <ac:chgData name="JOÃO PEDRO DE SOUZA OLIVEIRA ANTONIO ." userId="a98d014e-0402-45de-8f01-fb0aefda0265" providerId="ADAL" clId="{FDD979A8-8338-4BC8-8370-413243D4005B}" dt="2025-10-27T02:43:23.842" v="1619" actId="1076"/>
+          <ac:spMkLst>
+            <pc:docMk/>
+            <pc:sldMk cId="1246143638" sldId="256"/>
+            <ac:spMk id="15" creationId="{11D5BE02-C8B5-F04B-7CD7-2B2EE9AEA103}"/>
           </ac:spMkLst>
         </pc:spChg>
         <pc:spChg chg="add mod">
@@ -231,16 +239,16 @@
             <ac:spMk id="16" creationId="{4E067341-4E2E-49F9-EF11-C51C82B90691}"/>
           </ac:spMkLst>
         </pc:spChg>
-        <pc:spChg chg="add del mod">
-          <ac:chgData name="JOÃO PEDRO DE SOUZA OLIVEIRA ANTONIO ." userId="a98d014e-0402-45de-8f01-fb0aefda0265" providerId="ADAL" clId="{FDD979A8-8338-4BC8-8370-413243D4005B}" dt="2025-10-22T21:01:15.443" v="1277" actId="478"/>
+        <pc:spChg chg="add mod">
+          <ac:chgData name="JOÃO PEDRO DE SOUZA OLIVEIRA ANTONIO ." userId="a98d014e-0402-45de-8f01-fb0aefda0265" providerId="ADAL" clId="{FDD979A8-8338-4BC8-8370-413243D4005B}" dt="2025-10-27T02:40:25.721" v="1550" actId="164"/>
           <ac:spMkLst>
             <pc:docMk/>
             <pc:sldMk cId="1246143638" sldId="256"/>
-            <ac:spMk id="17" creationId="{27D5107B-310C-46A0-431D-D65071D0FECF}"/>
+            <ac:spMk id="17" creationId="{E3247BEA-79E7-4022-F2A1-91768E72B927}"/>
           </ac:spMkLst>
         </pc:spChg>
         <pc:spChg chg="add mod">
-          <ac:chgData name="JOÃO PEDRO DE SOUZA OLIVEIRA ANTONIO ." userId="a98d014e-0402-45de-8f01-fb0aefda0265" providerId="ADAL" clId="{FDD979A8-8338-4BC8-8370-413243D4005B}" dt="2025-10-22T20:58:18.469" v="1204" actId="1076"/>
+          <ac:chgData name="JOÃO PEDRO DE SOUZA OLIVEIRA ANTONIO ." userId="a98d014e-0402-45de-8f01-fb0aefda0265" providerId="ADAL" clId="{FDD979A8-8338-4BC8-8370-413243D4005B}" dt="2025-10-27T02:42:17.526" v="1574" actId="1076"/>
           <ac:spMkLst>
             <pc:docMk/>
             <pc:sldMk cId="1246143638" sldId="256"/>
@@ -248,7 +256,7 @@
           </ac:spMkLst>
         </pc:spChg>
         <pc:spChg chg="add mod">
-          <ac:chgData name="JOÃO PEDRO DE SOUZA OLIVEIRA ANTONIO ." userId="a98d014e-0402-45de-8f01-fb0aefda0265" providerId="ADAL" clId="{FDD979A8-8338-4BC8-8370-413243D4005B}" dt="2025-10-22T20:57:43.241" v="1201" actId="1076"/>
+          <ac:chgData name="JOÃO PEDRO DE SOUZA OLIVEIRA ANTONIO ." userId="a98d014e-0402-45de-8f01-fb0aefda0265" providerId="ADAL" clId="{FDD979A8-8338-4BC8-8370-413243D4005B}" dt="2025-10-27T02:42:17.526" v="1574" actId="1076"/>
           <ac:spMkLst>
             <pc:docMk/>
             <pc:sldMk cId="1246143638" sldId="256"/>
@@ -256,19 +264,27 @@
           </ac:spMkLst>
         </pc:spChg>
         <pc:spChg chg="add mod">
-          <ac:chgData name="JOÃO PEDRO DE SOUZA OLIVEIRA ANTONIO ." userId="a98d014e-0402-45de-8f01-fb0aefda0265" providerId="ADAL" clId="{FDD979A8-8338-4BC8-8370-413243D4005B}" dt="2025-10-18T01:39:32.753" v="695" actId="1037"/>
+          <ac:chgData name="JOÃO PEDRO DE SOUZA OLIVEIRA ANTONIO ." userId="a98d014e-0402-45de-8f01-fb0aefda0265" providerId="ADAL" clId="{FDD979A8-8338-4BC8-8370-413243D4005B}" dt="2025-10-27T02:39:15.383" v="1542" actId="1076"/>
           <ac:spMkLst>
             <pc:docMk/>
             <pc:sldMk cId="1246143638" sldId="256"/>
             <ac:spMk id="20" creationId="{39595614-8081-67F5-A312-ACF2A6F75382}"/>
           </ac:spMkLst>
         </pc:spChg>
-        <pc:spChg chg="add del mod">
-          <ac:chgData name="JOÃO PEDRO DE SOUZA OLIVEIRA ANTONIO ." userId="a98d014e-0402-45de-8f01-fb0aefda0265" providerId="ADAL" clId="{FDD979A8-8338-4BC8-8370-413243D4005B}" dt="2025-10-22T20:55:47.613" v="1125" actId="478"/>
+        <pc:spChg chg="add mod">
+          <ac:chgData name="JOÃO PEDRO DE SOUZA OLIVEIRA ANTONIO ." userId="a98d014e-0402-45de-8f01-fb0aefda0265" providerId="ADAL" clId="{FDD979A8-8338-4BC8-8370-413243D4005B}" dt="2025-10-27T02:40:25.721" v="1550" actId="164"/>
           <ac:spMkLst>
             <pc:docMk/>
             <pc:sldMk cId="1246143638" sldId="256"/>
-            <ac:spMk id="24" creationId="{9BB36C46-E2CC-2FC3-7891-DFDE879D1D91}"/>
+            <ac:spMk id="22" creationId="{D3407A94-BA0B-0FB4-771A-A6ED9A519A2F}"/>
+          </ac:spMkLst>
+        </pc:spChg>
+        <pc:spChg chg="add mod">
+          <ac:chgData name="JOÃO PEDRO DE SOUZA OLIVEIRA ANTONIO ." userId="a98d014e-0402-45de-8f01-fb0aefda0265" providerId="ADAL" clId="{FDD979A8-8338-4BC8-8370-413243D4005B}" dt="2025-10-27T02:40:25.721" v="1550" actId="164"/>
+          <ac:spMkLst>
+            <pc:docMk/>
+            <pc:sldMk cId="1246143638" sldId="256"/>
+            <ac:spMk id="24" creationId="{D04DE7C9-0DD9-65D0-1440-4AE03EC135E8}"/>
           </ac:spMkLst>
         </pc:spChg>
         <pc:spChg chg="add mod">
@@ -296,7 +312,7 @@
           </ac:spMkLst>
         </pc:spChg>
         <pc:spChg chg="add mod">
-          <ac:chgData name="JOÃO PEDRO DE SOUZA OLIVEIRA ANTONIO ." userId="a98d014e-0402-45de-8f01-fb0aefda0265" providerId="ADAL" clId="{FDD979A8-8338-4BC8-8370-413243D4005B}" dt="2025-10-22T21:13:42.004" v="1437" actId="403"/>
+          <ac:chgData name="JOÃO PEDRO DE SOUZA OLIVEIRA ANTONIO ." userId="a98d014e-0402-45de-8f01-fb0aefda0265" providerId="ADAL" clId="{FDD979A8-8338-4BC8-8370-413243D4005B}" dt="2025-10-27T02:42:17.526" v="1574" actId="1076"/>
           <ac:spMkLst>
             <pc:docMk/>
             <pc:sldMk cId="1246143638" sldId="256"/>
@@ -304,7 +320,23 @@
           </ac:spMkLst>
         </pc:spChg>
         <pc:spChg chg="add mod">
-          <ac:chgData name="JOÃO PEDRO DE SOUZA OLIVEIRA ANTONIO ." userId="a98d014e-0402-45de-8f01-fb0aefda0265" providerId="ADAL" clId="{FDD979A8-8338-4BC8-8370-413243D4005B}" dt="2025-10-22T21:06:24.499" v="1378" actId="1037"/>
+          <ac:chgData name="JOÃO PEDRO DE SOUZA OLIVEIRA ANTONIO ." userId="a98d014e-0402-45de-8f01-fb0aefda0265" providerId="ADAL" clId="{FDD979A8-8338-4BC8-8370-413243D4005B}" dt="2025-10-27T02:40:25.721" v="1550" actId="164"/>
+          <ac:spMkLst>
+            <pc:docMk/>
+            <pc:sldMk cId="1246143638" sldId="256"/>
+            <ac:spMk id="30" creationId="{A29D5961-A318-3119-0DE2-E8FAD47FAA2A}"/>
+          </ac:spMkLst>
+        </pc:spChg>
+        <pc:spChg chg="add mod">
+          <ac:chgData name="JOÃO PEDRO DE SOUZA OLIVEIRA ANTONIO ." userId="a98d014e-0402-45de-8f01-fb0aefda0265" providerId="ADAL" clId="{FDD979A8-8338-4BC8-8370-413243D4005B}" dt="2025-10-27T02:40:17.389" v="1549" actId="164"/>
+          <ac:spMkLst>
+            <pc:docMk/>
+            <pc:sldMk cId="1246143638" sldId="256"/>
+            <ac:spMk id="31" creationId="{423D7517-0597-51F8-9D8B-61E059963FC5}"/>
+          </ac:spMkLst>
+        </pc:spChg>
+        <pc:spChg chg="add mod">
+          <ac:chgData name="JOÃO PEDRO DE SOUZA OLIVEIRA ANTONIO ." userId="a98d014e-0402-45de-8f01-fb0aefda0265" providerId="ADAL" clId="{FDD979A8-8338-4BC8-8370-413243D4005B}" dt="2025-10-27T02:39:15.383" v="1542" actId="1076"/>
           <ac:spMkLst>
             <pc:docMk/>
             <pc:sldMk cId="1246143638" sldId="256"/>
@@ -328,7 +360,7 @@
           </ac:spMkLst>
         </pc:spChg>
         <pc:spChg chg="add mod">
-          <ac:chgData name="JOÃO PEDRO DE SOUZA OLIVEIRA ANTONIO ." userId="a98d014e-0402-45de-8f01-fb0aefda0265" providerId="ADAL" clId="{FDD979A8-8338-4BC8-8370-413243D4005B}" dt="2025-10-22T21:06:24.499" v="1378" actId="1037"/>
+          <ac:chgData name="JOÃO PEDRO DE SOUZA OLIVEIRA ANTONIO ." userId="a98d014e-0402-45de-8f01-fb0aefda0265" providerId="ADAL" clId="{FDD979A8-8338-4BC8-8370-413243D4005B}" dt="2025-10-27T02:39:15.383" v="1542" actId="1076"/>
           <ac:spMkLst>
             <pc:docMk/>
             <pc:sldMk cId="1246143638" sldId="256"/>
@@ -344,7 +376,7 @@
           </ac:spMkLst>
         </pc:spChg>
         <pc:spChg chg="add mod">
-          <ac:chgData name="JOÃO PEDRO DE SOUZA OLIVEIRA ANTONIO ." userId="a98d014e-0402-45de-8f01-fb0aefda0265" providerId="ADAL" clId="{FDD979A8-8338-4BC8-8370-413243D4005B}" dt="2025-10-22T21:06:53.672" v="1389" actId="1037"/>
+          <ac:chgData name="JOÃO PEDRO DE SOUZA OLIVEIRA ANTONIO ." userId="a98d014e-0402-45de-8f01-fb0aefda0265" providerId="ADAL" clId="{FDD979A8-8338-4BC8-8370-413243D4005B}" dt="2025-10-27T02:39:15.383" v="1542" actId="1076"/>
           <ac:spMkLst>
             <pc:docMk/>
             <pc:sldMk cId="1246143638" sldId="256"/>
@@ -352,7 +384,7 @@
           </ac:spMkLst>
         </pc:spChg>
         <pc:spChg chg="add mod">
-          <ac:chgData name="JOÃO PEDRO DE SOUZA OLIVEIRA ANTONIO ." userId="a98d014e-0402-45de-8f01-fb0aefda0265" providerId="ADAL" clId="{FDD979A8-8338-4BC8-8370-413243D4005B}" dt="2025-10-22T21:06:36.240" v="1382" actId="1038"/>
+          <ac:chgData name="JOÃO PEDRO DE SOUZA OLIVEIRA ANTONIO ." userId="a98d014e-0402-45de-8f01-fb0aefda0265" providerId="ADAL" clId="{FDD979A8-8338-4BC8-8370-413243D4005B}" dt="2025-10-27T02:39:15.383" v="1542" actId="1076"/>
           <ac:spMkLst>
             <pc:docMk/>
             <pc:sldMk cId="1246143638" sldId="256"/>
@@ -360,7 +392,7 @@
           </ac:spMkLst>
         </pc:spChg>
         <pc:spChg chg="add mod">
-          <ac:chgData name="JOÃO PEDRO DE SOUZA OLIVEIRA ANTONIO ." userId="a98d014e-0402-45de-8f01-fb0aefda0265" providerId="ADAL" clId="{FDD979A8-8338-4BC8-8370-413243D4005B}" dt="2025-10-22T21:06:36.240" v="1382" actId="1038"/>
+          <ac:chgData name="JOÃO PEDRO DE SOUZA OLIVEIRA ANTONIO ." userId="a98d014e-0402-45de-8f01-fb0aefda0265" providerId="ADAL" clId="{FDD979A8-8338-4BC8-8370-413243D4005B}" dt="2025-10-22T21:42:34.548" v="1446" actId="1076"/>
           <ac:spMkLst>
             <pc:docMk/>
             <pc:sldMk cId="1246143638" sldId="256"/>
@@ -368,7 +400,7 @@
           </ac:spMkLst>
         </pc:spChg>
         <pc:spChg chg="add mod">
-          <ac:chgData name="JOÃO PEDRO DE SOUZA OLIVEIRA ANTONIO ." userId="a98d014e-0402-45de-8f01-fb0aefda0265" providerId="ADAL" clId="{FDD979A8-8338-4BC8-8370-413243D4005B}" dt="2025-10-18T01:39:22.778" v="667" actId="1036"/>
+          <ac:chgData name="JOÃO PEDRO DE SOUZA OLIVEIRA ANTONIO ." userId="a98d014e-0402-45de-8f01-fb0aefda0265" providerId="ADAL" clId="{FDD979A8-8338-4BC8-8370-413243D4005B}" dt="2025-10-27T02:39:15.383" v="1542" actId="1076"/>
           <ac:spMkLst>
             <pc:docMk/>
             <pc:sldMk cId="1246143638" sldId="256"/>
@@ -376,7 +408,7 @@
           </ac:spMkLst>
         </pc:spChg>
         <pc:spChg chg="add mod">
-          <ac:chgData name="JOÃO PEDRO DE SOUZA OLIVEIRA ANTONIO ." userId="a98d014e-0402-45de-8f01-fb0aefda0265" providerId="ADAL" clId="{FDD979A8-8338-4BC8-8370-413243D4005B}" dt="2025-10-22T21:06:36.240" v="1382" actId="1038"/>
+          <ac:chgData name="JOÃO PEDRO DE SOUZA OLIVEIRA ANTONIO ." userId="a98d014e-0402-45de-8f01-fb0aefda0265" providerId="ADAL" clId="{FDD979A8-8338-4BC8-8370-413243D4005B}" dt="2025-10-27T02:39:15.383" v="1542" actId="1076"/>
           <ac:spMkLst>
             <pc:docMk/>
             <pc:sldMk cId="1246143638" sldId="256"/>
@@ -440,7 +472,7 @@
           </ac:spMkLst>
         </pc:spChg>
         <pc:spChg chg="add mod">
-          <ac:chgData name="JOÃO PEDRO DE SOUZA OLIVEIRA ANTONIO ." userId="a98d014e-0402-45de-8f01-fb0aefda0265" providerId="ADAL" clId="{FDD979A8-8338-4BC8-8370-413243D4005B}" dt="2025-10-18T01:37:05.901" v="643" actId="20577"/>
+          <ac:chgData name="JOÃO PEDRO DE SOUZA OLIVEIRA ANTONIO ." userId="a98d014e-0402-45de-8f01-fb0aefda0265" providerId="ADAL" clId="{FDD979A8-8338-4BC8-8370-413243D4005B}" dt="2025-10-27T02:37:19.072" v="1493" actId="14100"/>
           <ac:spMkLst>
             <pc:docMk/>
             <pc:sldMk cId="1246143638" sldId="256"/>
@@ -472,7 +504,7 @@
           </ac:spMkLst>
         </pc:spChg>
         <pc:spChg chg="add mod">
-          <ac:chgData name="JOÃO PEDRO DE SOUZA OLIVEIRA ANTONIO ." userId="a98d014e-0402-45de-8f01-fb0aefda0265" providerId="ADAL" clId="{FDD979A8-8338-4BC8-8370-413243D4005B}" dt="2025-10-22T21:01:19.091" v="1278" actId="1076"/>
+          <ac:chgData name="JOÃO PEDRO DE SOUZA OLIVEIRA ANTONIO ." userId="a98d014e-0402-45de-8f01-fb0aefda0265" providerId="ADAL" clId="{FDD979A8-8338-4BC8-8370-413243D4005B}" dt="2025-10-27T02:42:17.526" v="1574" actId="1076"/>
           <ac:spMkLst>
             <pc:docMk/>
             <pc:sldMk cId="1246143638" sldId="256"/>
@@ -480,35 +512,147 @@
           </ac:spMkLst>
         </pc:spChg>
         <pc:spChg chg="add mod">
-          <ac:chgData name="JOÃO PEDRO DE SOUZA OLIVEIRA ANTONIO ." userId="a98d014e-0402-45de-8f01-fb0aefda0265" providerId="ADAL" clId="{FDD979A8-8338-4BC8-8370-413243D4005B}" dt="2025-10-22T21:13:34.389" v="1434" actId="403"/>
+          <ac:chgData name="JOÃO PEDRO DE SOUZA OLIVEIRA ANTONIO ." userId="a98d014e-0402-45de-8f01-fb0aefda0265" providerId="ADAL" clId="{FDD979A8-8338-4BC8-8370-413243D4005B}" dt="2025-10-27T02:40:17.389" v="1549" actId="164"/>
+          <ac:spMkLst>
+            <pc:docMk/>
+            <pc:sldMk cId="1246143638" sldId="256"/>
+            <ac:spMk id="61" creationId="{7F0FCE74-ED3D-3E31-C8CC-D769CBA9B8C4}"/>
+          </ac:spMkLst>
+        </pc:spChg>
+        <pc:spChg chg="add mod">
+          <ac:chgData name="JOÃO PEDRO DE SOUZA OLIVEIRA ANTONIO ." userId="a98d014e-0402-45de-8f01-fb0aefda0265" providerId="ADAL" clId="{FDD979A8-8338-4BC8-8370-413243D4005B}" dt="2025-10-27T02:40:17.389" v="1549" actId="164"/>
+          <ac:spMkLst>
+            <pc:docMk/>
+            <pc:sldMk cId="1246143638" sldId="256"/>
+            <ac:spMk id="63" creationId="{383AB197-322C-7111-B12E-39643FD71022}"/>
+          </ac:spMkLst>
+        </pc:spChg>
+        <pc:spChg chg="add mod">
+          <ac:chgData name="JOÃO PEDRO DE SOUZA OLIVEIRA ANTONIO ." userId="a98d014e-0402-45de-8f01-fb0aefda0265" providerId="ADAL" clId="{FDD979A8-8338-4BC8-8370-413243D4005B}" dt="2025-10-27T02:39:15.383" v="1542" actId="1076"/>
           <ac:spMkLst>
             <pc:docMk/>
             <pc:sldMk cId="1246143638" sldId="256"/>
             <ac:spMk id="64" creationId="{A8098ABF-C100-2FF0-DBC5-3689F1B1C6A3}"/>
           </ac:spMkLst>
         </pc:spChg>
-        <pc:spChg chg="add del mod">
-          <ac:chgData name="JOÃO PEDRO DE SOUZA OLIVEIRA ANTONIO ." userId="a98d014e-0402-45de-8f01-fb0aefda0265" providerId="ADAL" clId="{FDD979A8-8338-4BC8-8370-413243D4005B}" dt="2025-10-22T21:06:39.706" v="1383" actId="478"/>
+        <pc:spChg chg="add mod">
+          <ac:chgData name="JOÃO PEDRO DE SOUZA OLIVEIRA ANTONIO ." userId="a98d014e-0402-45de-8f01-fb0aefda0265" providerId="ADAL" clId="{FDD979A8-8338-4BC8-8370-413243D4005B}" dt="2025-10-27T02:40:17.389" v="1549" actId="164"/>
           <ac:spMkLst>
             <pc:docMk/>
             <pc:sldMk cId="1246143638" sldId="256"/>
-            <ac:spMk id="72" creationId="{4CD7FE34-53E4-6227-9E29-95C222756769}"/>
+            <ac:spMk id="66" creationId="{66AE83B0-5CDF-3644-C416-C7014F6D9DCF}"/>
           </ac:spMkLst>
         </pc:spChg>
-        <pc:spChg chg="add del mod">
-          <ac:chgData name="JOÃO PEDRO DE SOUZA OLIVEIRA ANTONIO ." userId="a98d014e-0402-45de-8f01-fb0aefda0265" providerId="ADAL" clId="{FDD979A8-8338-4BC8-8370-413243D4005B}" dt="2025-10-22T21:06:43.859" v="1384" actId="478"/>
+        <pc:spChg chg="add mod">
+          <ac:chgData name="JOÃO PEDRO DE SOUZA OLIVEIRA ANTONIO ." userId="a98d014e-0402-45de-8f01-fb0aefda0265" providerId="ADAL" clId="{FDD979A8-8338-4BC8-8370-413243D4005B}" dt="2025-10-27T02:40:35.459" v="1551" actId="164"/>
           <ac:spMkLst>
             <pc:docMk/>
             <pc:sldMk cId="1246143638" sldId="256"/>
-            <ac:spMk id="73" creationId="{19516BC1-C27A-7579-C51E-44AA29A18681}"/>
+            <ac:spMk id="69" creationId="{40CAC9EC-7E4F-3482-AFFA-F3317E31AA13}"/>
           </ac:spMkLst>
         </pc:spChg>
-        <pc:picChg chg="add del mod">
-          <ac:chgData name="JOÃO PEDRO DE SOUZA OLIVEIRA ANTONIO ." userId="a98d014e-0402-45de-8f01-fb0aefda0265" providerId="ADAL" clId="{FDD979A8-8338-4BC8-8370-413243D4005B}" dt="2025-10-22T21:10:58.513" v="1391" actId="478"/>
+        <pc:spChg chg="add mod">
+          <ac:chgData name="JOÃO PEDRO DE SOUZA OLIVEIRA ANTONIO ." userId="a98d014e-0402-45de-8f01-fb0aefda0265" providerId="ADAL" clId="{FDD979A8-8338-4BC8-8370-413243D4005B}" dt="2025-10-27T02:40:35.459" v="1551" actId="164"/>
+          <ac:spMkLst>
+            <pc:docMk/>
+            <pc:sldMk cId="1246143638" sldId="256"/>
+            <ac:spMk id="70" creationId="{41EF0E19-E6CA-61F7-0182-8FEA70969F21}"/>
+          </ac:spMkLst>
+        </pc:spChg>
+        <pc:spChg chg="add mod">
+          <ac:chgData name="JOÃO PEDRO DE SOUZA OLIVEIRA ANTONIO ." userId="a98d014e-0402-45de-8f01-fb0aefda0265" providerId="ADAL" clId="{FDD979A8-8338-4BC8-8370-413243D4005B}" dt="2025-10-27T02:40:35.459" v="1551" actId="164"/>
+          <ac:spMkLst>
+            <pc:docMk/>
+            <pc:sldMk cId="1246143638" sldId="256"/>
+            <ac:spMk id="72" creationId="{F2C9B66C-653B-081F-5A5A-B8E3991F3428}"/>
+          </ac:spMkLst>
+        </pc:spChg>
+        <pc:spChg chg="add mod">
+          <ac:chgData name="JOÃO PEDRO DE SOUZA OLIVEIRA ANTONIO ." userId="a98d014e-0402-45de-8f01-fb0aefda0265" providerId="ADAL" clId="{FDD979A8-8338-4BC8-8370-413243D4005B}" dt="2025-10-27T02:40:35.459" v="1551" actId="164"/>
+          <ac:spMkLst>
+            <pc:docMk/>
+            <pc:sldMk cId="1246143638" sldId="256"/>
+            <ac:spMk id="73" creationId="{E73D1FEA-6BDE-AB21-4649-4AF818EF0DBF}"/>
+          </ac:spMkLst>
+        </pc:spChg>
+        <pc:spChg chg="add mod">
+          <ac:chgData name="JOÃO PEDRO DE SOUZA OLIVEIRA ANTONIO ." userId="a98d014e-0402-45de-8f01-fb0aefda0265" providerId="ADAL" clId="{FDD979A8-8338-4BC8-8370-413243D4005B}" dt="2025-10-27T02:42:26.359" v="1575"/>
+          <ac:spMkLst>
+            <pc:docMk/>
+            <pc:sldMk cId="1246143638" sldId="256"/>
+            <ac:spMk id="88" creationId="{987A6B90-3FD5-0118-0D1C-F491BDBEE636}"/>
+          </ac:spMkLst>
+        </pc:spChg>
+        <pc:spChg chg="add mod">
+          <ac:chgData name="JOÃO PEDRO DE SOUZA OLIVEIRA ANTONIO ." userId="a98d014e-0402-45de-8f01-fb0aefda0265" providerId="ADAL" clId="{FDD979A8-8338-4BC8-8370-413243D4005B}" dt="2025-10-27T02:42:26.359" v="1575"/>
+          <ac:spMkLst>
+            <pc:docMk/>
+            <pc:sldMk cId="1246143638" sldId="256"/>
+            <ac:spMk id="89" creationId="{417E14EC-238E-3686-7648-8CECBC69AC24}"/>
+          </ac:spMkLst>
+        </pc:spChg>
+        <pc:spChg chg="add mod">
+          <ac:chgData name="JOÃO PEDRO DE SOUZA OLIVEIRA ANTONIO ." userId="a98d014e-0402-45de-8f01-fb0aefda0265" providerId="ADAL" clId="{FDD979A8-8338-4BC8-8370-413243D4005B}" dt="2025-10-27T02:42:26.359" v="1575"/>
+          <ac:spMkLst>
+            <pc:docMk/>
+            <pc:sldMk cId="1246143638" sldId="256"/>
+            <ac:spMk id="90" creationId="{2301BF63-052D-E62C-1760-AC08DF26F179}"/>
+          </ac:spMkLst>
+        </pc:spChg>
+        <pc:spChg chg="add mod">
+          <ac:chgData name="JOÃO PEDRO DE SOUZA OLIVEIRA ANTONIO ." userId="a98d014e-0402-45de-8f01-fb0aefda0265" providerId="ADAL" clId="{FDD979A8-8338-4BC8-8370-413243D4005B}" dt="2025-10-27T02:42:26.359" v="1575"/>
+          <ac:spMkLst>
+            <pc:docMk/>
+            <pc:sldMk cId="1246143638" sldId="256"/>
+            <ac:spMk id="91" creationId="{23C1F9DA-81A3-2E79-04C4-675C22F0A14F}"/>
+          </ac:spMkLst>
+        </pc:spChg>
+        <pc:grpChg chg="add mod">
+          <ac:chgData name="JOÃO PEDRO DE SOUZA OLIVEIRA ANTONIO ." userId="a98d014e-0402-45de-8f01-fb0aefda0265" providerId="ADAL" clId="{FDD979A8-8338-4BC8-8370-413243D4005B}" dt="2025-10-27T02:43:23.842" v="1619" actId="1076"/>
+          <ac:grpSpMkLst>
+            <pc:docMk/>
+            <pc:sldMk cId="1246143638" sldId="256"/>
+            <ac:grpSpMk id="67" creationId="{26563F42-A05A-15F2-29FC-A7A22001FD86}"/>
+          </ac:grpSpMkLst>
+        </pc:grpChg>
+        <pc:grpChg chg="add mod">
+          <ac:chgData name="JOÃO PEDRO DE SOUZA OLIVEIRA ANTONIO ." userId="a98d014e-0402-45de-8f01-fb0aefda0265" providerId="ADAL" clId="{FDD979A8-8338-4BC8-8370-413243D4005B}" dt="2025-10-27T02:43:14.200" v="1609" actId="1038"/>
+          <ac:grpSpMkLst>
+            <pc:docMk/>
+            <pc:sldMk cId="1246143638" sldId="256"/>
+            <ac:grpSpMk id="75" creationId="{09AE5A84-17F6-2871-5917-970DCEA35313}"/>
+          </ac:grpSpMkLst>
+        </pc:grpChg>
+        <pc:grpChg chg="add mod">
+          <ac:chgData name="JOÃO PEDRO DE SOUZA OLIVEIRA ANTONIO ." userId="a98d014e-0402-45de-8f01-fb0aefda0265" providerId="ADAL" clId="{FDD979A8-8338-4BC8-8370-413243D4005B}" dt="2025-10-27T02:43:12.247" v="1604" actId="1038"/>
+          <ac:grpSpMkLst>
+            <pc:docMk/>
+            <pc:sldMk cId="1246143638" sldId="256"/>
+            <ac:grpSpMk id="77" creationId="{40267A71-7801-4EF1-F079-62BB9A880253}"/>
+          </ac:grpSpMkLst>
+        </pc:grpChg>
+        <pc:grpChg chg="add mod">
+          <ac:chgData name="JOÃO PEDRO DE SOUZA OLIVEIRA ANTONIO ." userId="a98d014e-0402-45de-8f01-fb0aefda0265" providerId="ADAL" clId="{FDD979A8-8338-4BC8-8370-413243D4005B}" dt="2025-10-27T02:43:18.298" v="1618" actId="1037"/>
+          <ac:grpSpMkLst>
+            <pc:docMk/>
+            <pc:sldMk cId="1246143638" sldId="256"/>
+            <ac:grpSpMk id="78" creationId="{BA40A79E-DAE9-AEE2-990B-479C7D580736}"/>
+          </ac:grpSpMkLst>
+        </pc:grpChg>
+        <pc:grpChg chg="add mod">
+          <ac:chgData name="JOÃO PEDRO DE SOUZA OLIVEIRA ANTONIO ." userId="a98d014e-0402-45de-8f01-fb0aefda0265" providerId="ADAL" clId="{FDD979A8-8338-4BC8-8370-413243D4005B}" dt="2025-10-27T02:42:17.526" v="1574" actId="1076"/>
+          <ac:grpSpMkLst>
+            <pc:docMk/>
+            <pc:sldMk cId="1246143638" sldId="256"/>
+            <ac:grpSpMk id="84" creationId="{63DDCF06-02B0-5E9D-EA06-055DC9F9EBC2}"/>
+          </ac:grpSpMkLst>
+        </pc:grpChg>
+        <pc:picChg chg="add mod">
+          <ac:chgData name="JOÃO PEDRO DE SOUZA OLIVEIRA ANTONIO ." userId="a98d014e-0402-45de-8f01-fb0aefda0265" providerId="ADAL" clId="{FDD979A8-8338-4BC8-8370-413243D4005B}" dt="2025-10-27T02:40:04.476" v="1548" actId="1076"/>
           <ac:picMkLst>
             <pc:docMk/>
             <pc:sldMk cId="1246143638" sldId="256"/>
-            <ac:picMk id="6" creationId="{DB021F9F-64E0-3935-DCF4-0AB5F568E608}"/>
+            <ac:picMk id="6" creationId="{673F41ED-B7CA-0008-2A48-D612E318EFD4}"/>
           </ac:picMkLst>
         </pc:picChg>
         <pc:picChg chg="add mod">
@@ -519,28 +663,12 @@
             <ac:picMk id="12" creationId="{1FE35405-5FDC-8CC6-1536-B0550104E454}"/>
           </ac:picMkLst>
         </pc:picChg>
-        <pc:picChg chg="add del mod">
-          <ac:chgData name="JOÃO PEDRO DE SOUZA OLIVEIRA ANTONIO ." userId="a98d014e-0402-45de-8f01-fb0aefda0265" providerId="ADAL" clId="{FDD979A8-8338-4BC8-8370-413243D4005B}" dt="2025-10-22T20:59:27.091" v="1212" actId="478"/>
-          <ac:picMkLst>
-            <pc:docMk/>
-            <pc:sldMk cId="1246143638" sldId="256"/>
-            <ac:picMk id="15" creationId="{840FF247-C71F-F5A1-FEC4-B0837C1C9C7A}"/>
-          </ac:picMkLst>
-        </pc:picChg>
         <pc:picChg chg="add mod">
           <ac:chgData name="JOÃO PEDRO DE SOUZA OLIVEIRA ANTONIO ." userId="a98d014e-0402-45de-8f01-fb0aefda0265" providerId="ADAL" clId="{FDD979A8-8338-4BC8-8370-413243D4005B}" dt="2025-10-18T01:23:57.772" v="445" actId="1076"/>
           <ac:picMkLst>
             <pc:docMk/>
             <pc:sldMk cId="1246143638" sldId="256"/>
             <ac:picMk id="21" creationId="{F313C3E5-4B93-AF59-7CBD-347106D2A1B9}"/>
-          </ac:picMkLst>
-        </pc:picChg>
-        <pc:picChg chg="add del mod">
-          <ac:chgData name="JOÃO PEDRO DE SOUZA OLIVEIRA ANTONIO ." userId="a98d014e-0402-45de-8f01-fb0aefda0265" providerId="ADAL" clId="{FDD979A8-8338-4BC8-8370-413243D4005B}" dt="2025-10-22T20:55:20.065" v="1117" actId="478"/>
-          <ac:picMkLst>
-            <pc:docMk/>
-            <pc:sldMk cId="1246143638" sldId="256"/>
-            <ac:picMk id="22" creationId="{A0794764-F8BF-2F9A-B3FB-2E1C19B138D9}"/>
           </ac:picMkLst>
         </pc:picChg>
         <pc:picChg chg="add mod">
@@ -560,7 +688,7 @@
           </ac:picMkLst>
         </pc:picChg>
         <pc:picChg chg="add mod">
-          <ac:chgData name="JOÃO PEDRO DE SOUZA OLIVEIRA ANTONIO ." userId="a98d014e-0402-45de-8f01-fb0aefda0265" providerId="ADAL" clId="{FDD979A8-8338-4BC8-8370-413243D4005B}" dt="2025-10-22T21:07:07.256" v="1390" actId="1076"/>
+          <ac:chgData name="JOÃO PEDRO DE SOUZA OLIVEIRA ANTONIO ." userId="a98d014e-0402-45de-8f01-fb0aefda0265" providerId="ADAL" clId="{FDD979A8-8338-4BC8-8370-413243D4005B}" dt="2025-10-22T21:42:34.548" v="1446" actId="1076"/>
           <ac:picMkLst>
             <pc:docMk/>
             <pc:sldMk cId="1246143638" sldId="256"/>
@@ -584,11 +712,19 @@
           </ac:picMkLst>
         </pc:picChg>
         <pc:picChg chg="add mod">
-          <ac:chgData name="JOÃO PEDRO DE SOUZA OLIVEIRA ANTONIO ." userId="a98d014e-0402-45de-8f01-fb0aefda0265" providerId="ADAL" clId="{FDD979A8-8338-4BC8-8370-413243D4005B}" dt="2025-10-22T20:59:32.869" v="1213" actId="1076"/>
+          <ac:chgData name="JOÃO PEDRO DE SOUZA OLIVEIRA ANTONIO ." userId="a98d014e-0402-45de-8f01-fb0aefda0265" providerId="ADAL" clId="{FDD979A8-8338-4BC8-8370-413243D4005B}" dt="2025-10-27T02:42:17.526" v="1574" actId="1076"/>
           <ac:picMkLst>
             <pc:docMk/>
             <pc:sldMk cId="1246143638" sldId="256"/>
             <ac:picMk id="58" creationId="{2B38ECD1-5A25-08B8-866D-A3E9280E8069}"/>
+          </ac:picMkLst>
+        </pc:picChg>
+        <pc:picChg chg="add mod">
+          <ac:chgData name="JOÃO PEDRO DE SOUZA OLIVEIRA ANTONIO ." userId="a98d014e-0402-45de-8f01-fb0aefda0265" providerId="ADAL" clId="{FDD979A8-8338-4BC8-8370-413243D4005B}" dt="2025-10-27T02:43:23.842" v="1619" actId="1076"/>
+          <ac:picMkLst>
+            <pc:docMk/>
+            <pc:sldMk cId="1246143638" sldId="256"/>
+            <ac:picMk id="1026" creationId="{8D5994DC-74FC-70EA-E380-03BCD1715DE6}"/>
           </ac:picMkLst>
         </pc:picChg>
         <pc:cxnChg chg="add mod">
@@ -608,7 +744,7 @@
           </ac:cxnSpMkLst>
         </pc:cxnChg>
         <pc:cxnChg chg="add mod">
-          <ac:chgData name="JOÃO PEDRO DE SOUZA OLIVEIRA ANTONIO ." userId="a98d014e-0402-45de-8f01-fb0aefda0265" providerId="ADAL" clId="{FDD979A8-8338-4BC8-8370-413243D4005B}" dt="2025-10-22T21:01:36.322" v="1282" actId="14100"/>
+          <ac:chgData name="JOÃO PEDRO DE SOUZA OLIVEIRA ANTONIO ." userId="a98d014e-0402-45de-8f01-fb0aefda0265" providerId="ADAL" clId="{FDD979A8-8338-4BC8-8370-413243D4005B}" dt="2025-10-27T02:42:17.526" v="1574" actId="1076"/>
           <ac:cxnSpMkLst>
             <pc:docMk/>
             <pc:sldMk cId="1246143638" sldId="256"/>
@@ -616,15 +752,15 @@
           </ac:cxnSpMkLst>
         </pc:cxnChg>
         <pc:cxnChg chg="add mod">
-          <ac:chgData name="JOÃO PEDRO DE SOUZA OLIVEIRA ANTONIO ." userId="a98d014e-0402-45de-8f01-fb0aefda0265" providerId="ADAL" clId="{FDD979A8-8338-4BC8-8370-413243D4005B}" dt="2025-10-22T20:57:36.515" v="1200" actId="14100"/>
+          <ac:chgData name="JOÃO PEDRO DE SOUZA OLIVEIRA ANTONIO ." userId="a98d014e-0402-45de-8f01-fb0aefda0265" providerId="ADAL" clId="{FDD979A8-8338-4BC8-8370-413243D4005B}" dt="2025-10-27T02:43:14.200" v="1609" actId="1038"/>
           <ac:cxnSpMkLst>
             <pc:docMk/>
             <pc:sldMk cId="1246143638" sldId="256"/>
             <ac:cxnSpMk id="62" creationId="{2348B82E-BD8D-AF50-1E93-D1F06DE6591F}"/>
           </ac:cxnSpMkLst>
         </pc:cxnChg>
-        <pc:cxnChg chg="add mod">
-          <ac:chgData name="JOÃO PEDRO DE SOUZA OLIVEIRA ANTONIO ." userId="a98d014e-0402-45de-8f01-fb0aefda0265" providerId="ADAL" clId="{FDD979A8-8338-4BC8-8370-413243D4005B}" dt="2025-10-18T01:42:23.464" v="756" actId="14100"/>
+        <pc:cxnChg chg="add del mod">
+          <ac:chgData name="JOÃO PEDRO DE SOUZA OLIVEIRA ANTONIO ." userId="a98d014e-0402-45de-8f01-fb0aefda0265" providerId="ADAL" clId="{FDD979A8-8338-4BC8-8370-413243D4005B}" dt="2025-10-27T02:38:48.680" v="1538" actId="478"/>
           <ac:cxnSpMkLst>
             <pc:docMk/>
             <pc:sldMk cId="1246143638" sldId="256"/>
@@ -632,7 +768,7 @@
           </ac:cxnSpMkLst>
         </pc:cxnChg>
         <pc:cxnChg chg="add mod">
-          <ac:chgData name="JOÃO PEDRO DE SOUZA OLIVEIRA ANTONIO ." userId="a98d014e-0402-45de-8f01-fb0aefda0265" providerId="ADAL" clId="{FDD979A8-8338-4BC8-8370-413243D4005B}" dt="2025-10-22T21:06:53.672" v="1389" actId="1037"/>
+          <ac:chgData name="JOÃO PEDRO DE SOUZA OLIVEIRA ANTONIO ." userId="a98d014e-0402-45de-8f01-fb0aefda0265" providerId="ADAL" clId="{FDD979A8-8338-4BC8-8370-413243D4005B}" dt="2025-10-22T21:42:34.548" v="1446" actId="1076"/>
           <ac:cxnSpMkLst>
             <pc:docMk/>
             <pc:sldMk cId="1246143638" sldId="256"/>
@@ -640,7 +776,7 @@
           </ac:cxnSpMkLst>
         </pc:cxnChg>
         <pc:cxnChg chg="add mod">
-          <ac:chgData name="JOÃO PEDRO DE SOUZA OLIVEIRA ANTONIO ." userId="a98d014e-0402-45de-8f01-fb0aefda0265" providerId="ADAL" clId="{FDD979A8-8338-4BC8-8370-413243D4005B}" dt="2025-10-18T01:43:19.954" v="765" actId="1076"/>
+          <ac:chgData name="JOÃO PEDRO DE SOUZA OLIVEIRA ANTONIO ." userId="a98d014e-0402-45de-8f01-fb0aefda0265" providerId="ADAL" clId="{FDD979A8-8338-4BC8-8370-413243D4005B}" dt="2025-10-27T02:43:12.247" v="1604" actId="1038"/>
           <ac:cxnSpMkLst>
             <pc:docMk/>
             <pc:sldMk cId="1246143638" sldId="256"/>
@@ -648,11 +784,27 @@
           </ac:cxnSpMkLst>
         </pc:cxnChg>
         <pc:cxnChg chg="add mod">
-          <ac:chgData name="JOÃO PEDRO DE SOUZA OLIVEIRA ANTONIO ." userId="a98d014e-0402-45de-8f01-fb0aefda0265" providerId="ADAL" clId="{FDD979A8-8338-4BC8-8370-413243D4005B}" dt="2025-10-22T21:12:38.975" v="1423" actId="1076"/>
+          <ac:chgData name="JOÃO PEDRO DE SOUZA OLIVEIRA ANTONIO ." userId="a98d014e-0402-45de-8f01-fb0aefda0265" providerId="ADAL" clId="{FDD979A8-8338-4BC8-8370-413243D4005B}" dt="2025-10-27T02:43:18.298" v="1618" actId="1037"/>
           <ac:cxnSpMkLst>
             <pc:docMk/>
             <pc:sldMk cId="1246143638" sldId="256"/>
             <ac:cxnSpMk id="76" creationId="{6C9975B9-8961-9314-1908-362D9B43A80A}"/>
+          </ac:cxnSpMkLst>
+        </pc:cxnChg>
+        <pc:cxnChg chg="add mod">
+          <ac:chgData name="JOÃO PEDRO DE SOUZA OLIVEIRA ANTONIO ." userId="a98d014e-0402-45de-8f01-fb0aefda0265" providerId="ADAL" clId="{FDD979A8-8338-4BC8-8370-413243D4005B}" dt="2025-10-27T02:43:14.200" v="1609" actId="1038"/>
+          <ac:cxnSpMkLst>
+            <pc:docMk/>
+            <pc:sldMk cId="1246143638" sldId="256"/>
+            <ac:cxnSpMk id="92" creationId="{CB474522-9A46-A6B2-4CDD-A1F8E1C0B001}"/>
+          </ac:cxnSpMkLst>
+        </pc:cxnChg>
+        <pc:cxnChg chg="add mod">
+          <ac:chgData name="JOÃO PEDRO DE SOUZA OLIVEIRA ANTONIO ." userId="a98d014e-0402-45de-8f01-fb0aefda0265" providerId="ADAL" clId="{FDD979A8-8338-4BC8-8370-413243D4005B}" dt="2025-10-27T02:43:18.298" v="1618" actId="1037"/>
+          <ac:cxnSpMkLst>
+            <pc:docMk/>
+            <pc:sldMk cId="1246143638" sldId="256"/>
+            <ac:cxnSpMk id="95" creationId="{A033EB39-25AB-8019-43F7-10479F265B23}"/>
           </ac:cxnSpMkLst>
         </pc:cxnChg>
       </pc:sldChg>
@@ -808,7 +960,7 @@
           <a:p>
             <a:fld id="{20A535FE-D4A7-43BD-AECD-13DE7FF8965D}" type="datetimeFigureOut">
               <a:rPr lang="pt-BR" smtClean="0"/>
-              <a:t>22/10/2025</a:t>
+              <a:t>26/10/2025</a:t>
             </a:fld>
             <a:endParaRPr lang="pt-BR"/>
           </a:p>
@@ -1006,7 +1158,7 @@
           <a:p>
             <a:fld id="{20A535FE-D4A7-43BD-AECD-13DE7FF8965D}" type="datetimeFigureOut">
               <a:rPr lang="pt-BR" smtClean="0"/>
-              <a:t>22/10/2025</a:t>
+              <a:t>26/10/2025</a:t>
             </a:fld>
             <a:endParaRPr lang="pt-BR"/>
           </a:p>
@@ -1214,7 +1366,7 @@
           <a:p>
             <a:fld id="{20A535FE-D4A7-43BD-AECD-13DE7FF8965D}" type="datetimeFigureOut">
               <a:rPr lang="pt-BR" smtClean="0"/>
-              <a:t>22/10/2025</a:t>
+              <a:t>26/10/2025</a:t>
             </a:fld>
             <a:endParaRPr lang="pt-BR"/>
           </a:p>
@@ -1412,7 +1564,7 @@
           <a:p>
             <a:fld id="{20A535FE-D4A7-43BD-AECD-13DE7FF8965D}" type="datetimeFigureOut">
               <a:rPr lang="pt-BR" smtClean="0"/>
-              <a:t>22/10/2025</a:t>
+              <a:t>26/10/2025</a:t>
             </a:fld>
             <a:endParaRPr lang="pt-BR"/>
           </a:p>
@@ -1687,7 +1839,7 @@
           <a:p>
             <a:fld id="{20A535FE-D4A7-43BD-AECD-13DE7FF8965D}" type="datetimeFigureOut">
               <a:rPr lang="pt-BR" smtClean="0"/>
-              <a:t>22/10/2025</a:t>
+              <a:t>26/10/2025</a:t>
             </a:fld>
             <a:endParaRPr lang="pt-BR"/>
           </a:p>
@@ -1952,7 +2104,7 @@
           <a:p>
             <a:fld id="{20A535FE-D4A7-43BD-AECD-13DE7FF8965D}" type="datetimeFigureOut">
               <a:rPr lang="pt-BR" smtClean="0"/>
-              <a:t>22/10/2025</a:t>
+              <a:t>26/10/2025</a:t>
             </a:fld>
             <a:endParaRPr lang="pt-BR"/>
           </a:p>
@@ -2364,7 +2516,7 @@
           <a:p>
             <a:fld id="{20A535FE-D4A7-43BD-AECD-13DE7FF8965D}" type="datetimeFigureOut">
               <a:rPr lang="pt-BR" smtClean="0"/>
-              <a:t>22/10/2025</a:t>
+              <a:t>26/10/2025</a:t>
             </a:fld>
             <a:endParaRPr lang="pt-BR"/>
           </a:p>
@@ -2505,7 +2657,7 @@
           <a:p>
             <a:fld id="{20A535FE-D4A7-43BD-AECD-13DE7FF8965D}" type="datetimeFigureOut">
               <a:rPr lang="pt-BR" smtClean="0"/>
-              <a:t>22/10/2025</a:t>
+              <a:t>26/10/2025</a:t>
             </a:fld>
             <a:endParaRPr lang="pt-BR"/>
           </a:p>
@@ -2618,7 +2770,7 @@
           <a:p>
             <a:fld id="{20A535FE-D4A7-43BD-AECD-13DE7FF8965D}" type="datetimeFigureOut">
               <a:rPr lang="pt-BR" smtClean="0"/>
-              <a:t>22/10/2025</a:t>
+              <a:t>26/10/2025</a:t>
             </a:fld>
             <a:endParaRPr lang="pt-BR"/>
           </a:p>
@@ -2929,7 +3081,7 @@
           <a:p>
             <a:fld id="{20A535FE-D4A7-43BD-AECD-13DE7FF8965D}" type="datetimeFigureOut">
               <a:rPr lang="pt-BR" smtClean="0"/>
-              <a:t>22/10/2025</a:t>
+              <a:t>26/10/2025</a:t>
             </a:fld>
             <a:endParaRPr lang="pt-BR"/>
           </a:p>
@@ -3217,7 +3369,7 @@
           <a:p>
             <a:fld id="{20A535FE-D4A7-43BD-AECD-13DE7FF8965D}" type="datetimeFigureOut">
               <a:rPr lang="pt-BR" smtClean="0"/>
-              <a:t>22/10/2025</a:t>
+              <a:t>26/10/2025</a:t>
             </a:fld>
             <a:endParaRPr lang="pt-BR"/>
           </a:p>
@@ -3458,7 +3610,7 @@
           <a:p>
             <a:fld id="{20A535FE-D4A7-43BD-AECD-13DE7FF8965D}" type="datetimeFigureOut">
               <a:rPr lang="pt-BR" smtClean="0"/>
-              <a:t>22/10/2025</a:t>
+              <a:t>26/10/2025</a:t>
             </a:fld>
             <a:endParaRPr lang="pt-BR"/>
           </a:p>
@@ -4052,7 +4204,7 @@
         </p:nvSpPr>
         <p:spPr>
           <a:xfrm>
-            <a:off x="4104456" y="1709677"/>
+            <a:off x="-4690277" y="2716442"/>
             <a:ext cx="2193766" cy="1849962"/>
           </a:xfrm>
           <a:prstGeom prst="rect">
@@ -4132,7 +4284,7 @@
         </p:blipFill>
         <p:spPr>
           <a:xfrm>
-            <a:off x="4104455" y="3192706"/>
+            <a:off x="-4690278" y="4199471"/>
             <a:ext cx="381000" cy="381000"/>
           </a:xfrm>
           <a:prstGeom prst="rect">
@@ -4353,7 +4505,7 @@
         </p:nvSpPr>
         <p:spPr>
           <a:xfrm>
-            <a:off x="4474054" y="3244706"/>
+            <a:off x="-4320679" y="4251471"/>
             <a:ext cx="1124026" cy="276999"/>
           </a:xfrm>
           <a:prstGeom prst="rect">
@@ -4395,7 +4547,7 @@
         </p:nvSpPr>
         <p:spPr>
           <a:xfrm>
-            <a:off x="4311138" y="1812921"/>
+            <a:off x="-4483595" y="2819686"/>
             <a:ext cx="1770166" cy="1301748"/>
           </a:xfrm>
           <a:prstGeom prst="rect">
@@ -4464,7 +4616,7 @@
         </p:nvSpPr>
         <p:spPr>
           <a:xfrm>
-            <a:off x="4529666" y="1809660"/>
+            <a:off x="-4265067" y="2816425"/>
             <a:ext cx="1384866" cy="276999"/>
           </a:xfrm>
           <a:prstGeom prst="rect">
@@ -4506,7 +4658,7 @@
         </p:nvSpPr>
         <p:spPr>
           <a:xfrm>
-            <a:off x="6770849" y="1999980"/>
+            <a:off x="-2023884" y="3006745"/>
             <a:ext cx="1661032" cy="215444"/>
           </a:xfrm>
           <a:prstGeom prst="rect">
@@ -4545,7 +4697,7 @@
         </p:nvSpPr>
         <p:spPr>
           <a:xfrm>
-            <a:off x="6524397" y="1709677"/>
+            <a:off x="-2270336" y="2716442"/>
             <a:ext cx="2193766" cy="1849962"/>
           </a:xfrm>
           <a:prstGeom prst="rect">
@@ -4625,7 +4777,7 @@
         </p:blipFill>
         <p:spPr>
           <a:xfrm>
-            <a:off x="6524396" y="3192706"/>
+            <a:off x="-2270337" y="4199471"/>
             <a:ext cx="381000" cy="381000"/>
           </a:xfrm>
           <a:prstGeom prst="rect">
@@ -4647,7 +4799,7 @@
         </p:nvSpPr>
         <p:spPr>
           <a:xfrm>
-            <a:off x="6893995" y="3244706"/>
+            <a:off x="-1900738" y="4251471"/>
             <a:ext cx="1124026" cy="276999"/>
           </a:xfrm>
           <a:prstGeom prst="rect">
@@ -4689,7 +4841,7 @@
         </p:nvSpPr>
         <p:spPr>
           <a:xfrm>
-            <a:off x="6731079" y="1812921"/>
+            <a:off x="-2063654" y="2819686"/>
             <a:ext cx="1770166" cy="1301748"/>
           </a:xfrm>
           <a:prstGeom prst="rect">
@@ -4758,7 +4910,7 @@
         </p:nvSpPr>
         <p:spPr>
           <a:xfrm>
-            <a:off x="6949607" y="1809660"/>
+            <a:off x="-1845126" y="2816425"/>
             <a:ext cx="1384866" cy="276999"/>
           </a:xfrm>
           <a:prstGeom prst="rect">
@@ -4800,7 +4952,7 @@
         </p:nvSpPr>
         <p:spPr>
           <a:xfrm>
-            <a:off x="4376875" y="1992759"/>
+            <a:off x="-4417858" y="2999524"/>
             <a:ext cx="1612942" cy="215444"/>
           </a:xfrm>
           <a:prstGeom prst="rect">
@@ -4839,7 +4991,7 @@
         </p:nvSpPr>
         <p:spPr>
           <a:xfrm>
-            <a:off x="6357207" y="4020959"/>
+            <a:off x="-4673202" y="5192775"/>
             <a:ext cx="2193766" cy="1849962"/>
           </a:xfrm>
           <a:prstGeom prst="rect">
@@ -4919,7 +5071,7 @@
         </p:blipFill>
         <p:spPr>
           <a:xfrm>
-            <a:off x="6356342" y="5489183"/>
+            <a:off x="-4673202" y="6687737"/>
             <a:ext cx="381000" cy="381000"/>
           </a:xfrm>
           <a:prstGeom prst="rect">
@@ -4941,7 +5093,7 @@
         </p:nvSpPr>
         <p:spPr>
           <a:xfrm>
-            <a:off x="6755833" y="5555988"/>
+            <a:off x="-4273711" y="6754542"/>
             <a:ext cx="1124026" cy="276999"/>
           </a:xfrm>
           <a:prstGeom prst="rect">
@@ -4983,7 +5135,7 @@
         </p:nvSpPr>
         <p:spPr>
           <a:xfrm>
-            <a:off x="6592917" y="4124203"/>
+            <a:off x="-4437492" y="5296019"/>
             <a:ext cx="1770166" cy="1301748"/>
           </a:xfrm>
           <a:prstGeom prst="rect">
@@ -5052,7 +5204,7 @@
         </p:nvSpPr>
         <p:spPr>
           <a:xfrm>
-            <a:off x="6767903" y="4120942"/>
+            <a:off x="-4262506" y="5292758"/>
             <a:ext cx="1384866" cy="276999"/>
           </a:xfrm>
           <a:prstGeom prst="rect">
@@ -5094,7 +5246,7 @@
         </p:nvSpPr>
         <p:spPr>
           <a:xfrm>
-            <a:off x="6968287" y="4301123"/>
+            <a:off x="-4062122" y="5472939"/>
             <a:ext cx="1069524" cy="215444"/>
           </a:xfrm>
           <a:prstGeom prst="rect">
@@ -5543,7 +5695,7 @@
         <p:spPr>
           <a:xfrm>
             <a:off x="9468772" y="3530973"/>
-            <a:ext cx="6096000" cy="377026"/>
+            <a:ext cx="1227261" cy="377026"/>
           </a:xfrm>
           <a:prstGeom prst="rect">
             <a:avLst/>
@@ -5557,9 +5709,22 @@
           <a:lstStyle/>
           <a:p>
             <a:r>
-              <a:rPr lang="pt-BR" sz="1050" dirty="0"/>
-              <a:t>MySQL</a:t>
-            </a:r>
+              <a:rPr lang="en-US" altLang="en-US" sz="1050" dirty="0"/>
+              <a:t>Amazon</a:t>
+            </a:r>
+            <a:r>
+              <a:rPr lang="en-US" altLang="en-US" sz="1050" dirty="0">
+                <a:latin typeface="Aptos Body"/>
+                <a:ea typeface="Amazon Ember" panose="020B0603020204020204" pitchFamily="34" charset="0"/>
+                <a:cs typeface="Arial" panose="020B0604020202020204" pitchFamily="34" charset="0"/>
+              </a:rPr>
+              <a:t> </a:t>
+            </a:r>
+            <a:r>
+              <a:rPr lang="en-US" altLang="en-US" sz="1050" dirty="0"/>
+              <a:t>RDS</a:t>
+            </a:r>
+            <a:endParaRPr lang="pt-BR" sz="1050" dirty="0"/>
           </a:p>
           <a:p>
             <a:r>
@@ -5580,60 +5745,15 @@
           </p:cNvPr>
           <p:cNvCxnSpPr>
             <a:cxnSpLocks/>
-            <a:endCxn id="20" idx="1"/>
-          </p:cNvCxnSpPr>
-          <p:nvPr/>
-        </p:nvCxnSpPr>
-        <p:spPr>
-          <a:xfrm flipV="1">
-            <a:off x="2595972" y="2634658"/>
-            <a:ext cx="1508484" cy="9282"/>
-          </a:xfrm>
-          <a:prstGeom prst="straightConnector1">
-            <a:avLst/>
-          </a:prstGeom>
-          <a:ln>
-            <a:solidFill>
-              <a:schemeClr val="tx1"/>
-            </a:solidFill>
-            <a:prstDash val="lgDash"/>
-            <a:tailEnd type="triangle"/>
-          </a:ln>
-        </p:spPr>
-        <p:style>
-          <a:lnRef idx="2">
-            <a:schemeClr val="accent1"/>
-          </a:lnRef>
-          <a:fillRef idx="0">
-            <a:schemeClr val="accent1"/>
-          </a:fillRef>
-          <a:effectRef idx="1">
-            <a:schemeClr val="accent1"/>
-          </a:effectRef>
-          <a:fontRef idx="minor">
-            <a:schemeClr val="tx1"/>
-          </a:fontRef>
-        </p:style>
-      </p:cxnSp>
-      <p:cxnSp>
-        <p:nvCxnSpPr>
-          <p:cNvPr id="65" name="Straight Arrow Connector 64">
-            <a:extLst>
-              <a:ext uri="{FF2B5EF4-FFF2-40B4-BE49-F238E27FC236}">
-                <a16:creationId xmlns:a16="http://schemas.microsoft.com/office/drawing/2014/main" id="{0925B401-BDBE-6002-E7BC-F5F9C717C7C1}"/>
-              </a:ext>
-            </a:extLst>
-          </p:cNvPr>
-          <p:cNvCxnSpPr>
-            <a:cxnSpLocks/>
-            <a:stCxn id="20" idx="3"/>
+            <a:stCxn id="18" idx="3"/>
+            <a:endCxn id="66" idx="1"/>
           </p:cNvCxnSpPr>
           <p:nvPr/>
         </p:nvCxnSpPr>
         <p:spPr>
           <a:xfrm>
-            <a:off x="6298222" y="2634658"/>
-            <a:ext cx="497150" cy="7036"/>
+            <a:off x="2601198" y="2351273"/>
+            <a:ext cx="1889833" cy="7848"/>
           </a:xfrm>
           <a:prstGeom prst="straightConnector1">
             <a:avLst/>
@@ -5672,15 +5792,15 @@
           </p:cNvPr>
           <p:cNvCxnSpPr>
             <a:cxnSpLocks/>
-            <a:stCxn id="35" idx="2"/>
+            <a:stCxn id="20" idx="2"/>
             <a:endCxn id="39" idx="0"/>
           </p:cNvCxnSpPr>
           <p:nvPr/>
         </p:nvCxnSpPr>
         <p:spPr>
-          <a:xfrm flipH="1">
-            <a:off x="7454090" y="3521705"/>
-            <a:ext cx="1918" cy="499254"/>
+          <a:xfrm>
+            <a:off x="-3593394" y="4566404"/>
+            <a:ext cx="17075" cy="626371"/>
           </a:xfrm>
           <a:prstGeom prst="straightConnector1">
             <a:avLst/>
@@ -5719,13 +5839,15 @@
           </p:cNvPr>
           <p:cNvCxnSpPr>
             <a:cxnSpLocks/>
+            <a:stCxn id="30" idx="3"/>
+            <a:endCxn id="49" idx="1"/>
           </p:cNvCxnSpPr>
           <p:nvPr/>
         </p:nvCxnSpPr>
         <p:spPr>
           <a:xfrm>
-            <a:off x="8727242" y="2475954"/>
-            <a:ext cx="497150" cy="7036"/>
+            <a:off x="8433495" y="2311824"/>
+            <a:ext cx="1240991" cy="71"/>
           </a:xfrm>
           <a:prstGeom prst="straightConnector1">
             <a:avLst/>
@@ -5764,15 +5886,15 @@
           </p:cNvPr>
           <p:cNvCxnSpPr>
             <a:cxnSpLocks/>
-            <a:stCxn id="39" idx="3"/>
+            <a:stCxn id="73" idx="3"/>
             <a:endCxn id="4" idx="2"/>
           </p:cNvCxnSpPr>
           <p:nvPr/>
         </p:nvCxnSpPr>
         <p:spPr>
           <a:xfrm flipV="1">
-            <a:off x="8550973" y="3106530"/>
-            <a:ext cx="2145060" cy="1839410"/>
+            <a:off x="6185399" y="3106530"/>
+            <a:ext cx="4510634" cy="1106411"/>
           </a:xfrm>
           <a:prstGeom prst="bentConnector2">
             <a:avLst/>
@@ -5814,7 +5936,7 @@
         </p:nvSpPr>
         <p:spPr>
           <a:xfrm>
-            <a:off x="4391370" y="2199169"/>
+            <a:off x="-4403363" y="3205934"/>
             <a:ext cx="1675046" cy="769441"/>
           </a:xfrm>
           <a:prstGeom prst="rect">
@@ -5858,7 +5980,7 @@
         </p:nvSpPr>
         <p:spPr>
           <a:xfrm>
-            <a:off x="6803302" y="2245290"/>
+            <a:off x="-1991431" y="3252055"/>
             <a:ext cx="1699881" cy="600164"/>
           </a:xfrm>
           <a:prstGeom prst="rect">
@@ -5920,165 +6042,6 @@
             <a:r>
               <a:rPr lang="pt-BR" sz="1000" dirty="0"/>
               <a:t>Armazena as informações dos usuários e produtos do ferro velho</a:t>
-            </a:r>
-          </a:p>
-        </p:txBody>
-      </p:sp>
-      <p:sp>
-        <p:nvSpPr>
-          <p:cNvPr id="18" name="Rectangle 39" descr="VPC group border">
-            <a:extLst>
-              <a:ext uri="{FF2B5EF4-FFF2-40B4-BE49-F238E27FC236}">
-                <a16:creationId xmlns:a16="http://schemas.microsoft.com/office/drawing/2014/main" id="{71607CBD-DB5B-A629-C526-AA578739CEF8}"/>
-              </a:ext>
-            </a:extLst>
-          </p:cNvPr>
-          <p:cNvSpPr/>
-          <p:nvPr/>
-        </p:nvSpPr>
-        <p:spPr>
-          <a:xfrm>
-            <a:off x="561437" y="1725718"/>
-            <a:ext cx="2030570" cy="1795987"/>
-          </a:xfrm>
-          <a:prstGeom prst="rect">
-            <a:avLst/>
-          </a:prstGeom>
-          <a:noFill/>
-          <a:ln w="15875">
-            <a:solidFill>
-              <a:srgbClr val="8C4FFF"/>
-            </a:solidFill>
-          </a:ln>
-        </p:spPr>
-        <p:style>
-          <a:lnRef idx="2">
-            <a:schemeClr val="accent1">
-              <a:shade val="50000"/>
-            </a:schemeClr>
-          </a:lnRef>
-          <a:fillRef idx="1">
-            <a:schemeClr val="accent1"/>
-          </a:fillRef>
-          <a:effectRef idx="0">
-            <a:schemeClr val="accent1"/>
-          </a:effectRef>
-          <a:fontRef idx="minor">
-            <a:schemeClr val="lt1"/>
-          </a:fontRef>
-        </p:style>
-        <p:txBody>
-          <a:bodyPr lIns="502920" tIns="91440"/>
-          <a:lstStyle/>
-          <a:p>
-            <a:pPr eaLnBrk="1" fontAlgn="auto" hangingPunct="1">
-              <a:spcBef>
-                <a:spcPts val="0"/>
-              </a:spcBef>
-              <a:spcAft>
-                <a:spcPts val="0"/>
-              </a:spcAft>
-              <a:defRPr/>
-            </a:pPr>
-            <a:endParaRPr lang="en-US" sz="1200" dirty="0">
-              <a:ln w="0"/>
-              <a:solidFill>
-                <a:schemeClr val="tx1"/>
-              </a:solidFill>
-              <a:latin typeface="Arial" panose="020B0604020202020204" pitchFamily="34" charset="0"/>
-              <a:cs typeface="Arial" panose="020B0604020202020204" pitchFamily="34" charset="0"/>
-            </a:endParaRPr>
-          </a:p>
-        </p:txBody>
-      </p:sp>
-      <p:sp>
-        <p:nvSpPr>
-          <p:cNvPr id="19" name="TextBox 18">
-            <a:extLst>
-              <a:ext uri="{FF2B5EF4-FFF2-40B4-BE49-F238E27FC236}">
-                <a16:creationId xmlns:a16="http://schemas.microsoft.com/office/drawing/2014/main" id="{4F54A344-B603-BFFA-2EF3-1CB5DBA309E7}"/>
-              </a:ext>
-            </a:extLst>
-          </p:cNvPr>
-          <p:cNvSpPr txBox="1"/>
-          <p:nvPr/>
-        </p:nvSpPr>
-        <p:spPr>
-          <a:xfrm>
-            <a:off x="914716" y="1952948"/>
-            <a:ext cx="1417376" cy="246221"/>
-          </a:xfrm>
-          <a:prstGeom prst="rect">
-            <a:avLst/>
-          </a:prstGeom>
-        </p:spPr>
-        <p:txBody>
-          <a:bodyPr wrap="none" rtlCol="0">
-            <a:spAutoFit/>
-          </a:bodyPr>
-          <a:lstStyle>
-            <a:defPPr>
-              <a:defRPr lang="pt-BR"/>
-            </a:defPPr>
-            <a:lvl1pPr>
-              <a:defRPr sz="1000">
-                <a:ln w="0"/>
-                <a:solidFill>
-                  <a:srgbClr val="8C4FFF"/>
-                </a:solidFill>
-                <a:latin typeface="Arial" panose="020B0604020202020204" pitchFamily="34" charset="0"/>
-                <a:cs typeface="Arial" panose="020B0604020202020204" pitchFamily="34" charset="0"/>
-              </a:defRPr>
-            </a:lvl1pPr>
-          </a:lstStyle>
-          <a:p>
-            <a:r>
-              <a:rPr lang="en-US" dirty="0"/>
-              <a:t>[</a:t>
-            </a:r>
-            <a:r>
-              <a:rPr lang="en-US" dirty="0" err="1"/>
-              <a:t>Infraestructure</a:t>
-            </a:r>
-            <a:r>
-              <a:rPr lang="en-US" dirty="0"/>
-              <a:t> Node]</a:t>
-            </a:r>
-          </a:p>
-        </p:txBody>
-      </p:sp>
-      <p:sp>
-        <p:nvSpPr>
-          <p:cNvPr id="29" name="TextBox 28">
-            <a:extLst>
-              <a:ext uri="{FF2B5EF4-FFF2-40B4-BE49-F238E27FC236}">
-                <a16:creationId xmlns:a16="http://schemas.microsoft.com/office/drawing/2014/main" id="{94952A50-4362-E64E-8287-F1904C786D91}"/>
-              </a:ext>
-            </a:extLst>
-          </p:cNvPr>
-          <p:cNvSpPr txBox="1"/>
-          <p:nvPr/>
-        </p:nvSpPr>
-        <p:spPr>
-          <a:xfrm>
-            <a:off x="629462" y="2242509"/>
-            <a:ext cx="1923635" cy="600164"/>
-          </a:xfrm>
-          <a:prstGeom prst="rect">
-            <a:avLst/>
-          </a:prstGeom>
-          <a:noFill/>
-        </p:spPr>
-        <p:txBody>
-          <a:bodyPr wrap="square" rtlCol="0">
-            <a:spAutoFit/>
-          </a:bodyPr>
-          <a:lstStyle/>
-          <a:p>
-            <a:pPr algn="ctr"/>
-            <a:r>
-              <a:rPr lang="pt-BR" sz="1100" dirty="0"/>
-              <a:t>Distribui automaticamente entrada de tráfico na aplicação</a:t>
             </a:r>
           </a:p>
         </p:txBody>
@@ -6350,110 +6313,290 @@
           </a:p>
         </p:txBody>
       </p:sp>
-      <p:pic>
-        <p:nvPicPr>
-          <p:cNvPr id="58" name="Graphic 6" descr="Elastic Load Balancing service icon.">
-            <a:extLst>
-              <a:ext uri="{FF2B5EF4-FFF2-40B4-BE49-F238E27FC236}">
-                <a16:creationId xmlns:a16="http://schemas.microsoft.com/office/drawing/2014/main" id="{2B38ECD1-5A25-08B8-866D-A3E9280E8069}"/>
-              </a:ext>
-            </a:extLst>
-          </p:cNvPr>
-          <p:cNvPicPr>
-            <a:picLocks noChangeAspect="1" noChangeArrowheads="1"/>
-          </p:cNvPicPr>
+      <p:grpSp>
+        <p:nvGrpSpPr>
+          <p:cNvPr id="84" name="Group 83">
+            <a:extLst>
+              <a:ext uri="{FF2B5EF4-FFF2-40B4-BE49-F238E27FC236}">
+                <a16:creationId xmlns:a16="http://schemas.microsoft.com/office/drawing/2014/main" id="{63DDCF06-02B0-5E9D-EA06-055DC9F9EBC2}"/>
+              </a:ext>
+            </a:extLst>
+          </p:cNvPr>
+          <p:cNvGrpSpPr/>
           <p:nvPr/>
-        </p:nvPicPr>
-        <p:blipFill>
-          <a:blip r:embed="rId12">
-            <a:extLst>
-              <a:ext uri="{96DAC541-7B7A-43D3-8B79-37D633B846F1}">
-                <asvg:svgBlip xmlns:asvg="http://schemas.microsoft.com/office/drawing/2016/SVG/main" r:embed="rId13"/>
-              </a:ext>
-            </a:extLst>
-          </a:blip>
-          <a:srcRect/>
-          <a:stretch/>
-        </p:blipFill>
-        <p:spPr bwMode="auto">
+        </p:nvGrpSpPr>
+        <p:grpSpPr>
           <a:xfrm>
-            <a:off x="1394804" y="2950242"/>
-            <a:ext cx="457200" cy="457200"/>
-          </a:xfrm>
-          <a:prstGeom prst="rect">
-            <a:avLst/>
-          </a:prstGeom>
-          <a:extLst>
-            <a:ext uri="{909E8E84-426E-40DD-AFC4-6F175D3DCCD1}">
-              <a14:hiddenFill xmlns:a14="http://schemas.microsoft.com/office/drawing/2010/main">
-                <a:solidFill>
-                  <a:srgbClr val="FFFFFF"/>
-                </a:solidFill>
-              </a14:hiddenFill>
-            </a:ext>
-            <a:ext uri="{91240B29-F687-4F45-9708-019B960494DF}">
-              <a14:hiddenLine xmlns:a14="http://schemas.microsoft.com/office/drawing/2010/main" w="9525">
-                <a:solidFill>
-                  <a:srgbClr val="000000"/>
-                </a:solidFill>
-                <a:miter lim="800000"/>
-                <a:headEnd/>
-                <a:tailEnd/>
-              </a14:hiddenLine>
-            </a:ext>
-          </a:extLst>
-        </p:spPr>
-      </p:pic>
-      <p:sp>
-        <p:nvSpPr>
-          <p:cNvPr id="59" name="TextBox 12">
-            <a:extLst>
-              <a:ext uri="{FF2B5EF4-FFF2-40B4-BE49-F238E27FC236}">
-                <a16:creationId xmlns:a16="http://schemas.microsoft.com/office/drawing/2014/main" id="{E4C1E052-DD7D-7159-AA6B-C5A0784691B0}"/>
-              </a:ext>
-            </a:extLst>
-          </p:cNvPr>
-          <p:cNvSpPr txBox="1">
-            <a:spLocks noChangeArrowheads="1"/>
-          </p:cNvSpPr>
-          <p:nvPr/>
-        </p:nvSpPr>
-        <p:spPr bwMode="auto">
-          <a:xfrm>
-            <a:off x="641209" y="1740280"/>
-            <a:ext cx="1871025" cy="276999"/>
-          </a:xfrm>
-          <a:prstGeom prst="rect">
-            <a:avLst/>
-          </a:prstGeom>
-        </p:spPr>
-        <p:txBody>
-          <a:bodyPr wrap="none" rtlCol="0">
-            <a:spAutoFit/>
-          </a:bodyPr>
-          <a:lstStyle>
-            <a:defPPr>
-              <a:defRPr lang="pt-BR"/>
-            </a:defPPr>
-            <a:lvl1pPr>
-              <a:defRPr sz="1200" b="1">
+            <a:off x="570628" y="1453279"/>
+            <a:ext cx="2030570" cy="1795987"/>
+            <a:chOff x="561437" y="1725718"/>
+            <a:chExt cx="2030570" cy="1795987"/>
+          </a:xfrm>
+        </p:grpSpPr>
+        <p:sp>
+          <p:nvSpPr>
+            <p:cNvPr id="18" name="Rectangle 39" descr="VPC group border">
+              <a:extLst>
+                <a:ext uri="{FF2B5EF4-FFF2-40B4-BE49-F238E27FC236}">
+                  <a16:creationId xmlns:a16="http://schemas.microsoft.com/office/drawing/2014/main" id="{71607CBD-DB5B-A629-C526-AA578739CEF8}"/>
+                </a:ext>
+              </a:extLst>
+            </p:cNvPr>
+            <p:cNvSpPr/>
+            <p:nvPr/>
+          </p:nvSpPr>
+          <p:spPr>
+            <a:xfrm>
+              <a:off x="561437" y="1725718"/>
+              <a:ext cx="2030570" cy="1795987"/>
+            </a:xfrm>
+            <a:prstGeom prst="rect">
+              <a:avLst/>
+            </a:prstGeom>
+            <a:noFill/>
+            <a:ln w="15875">
+              <a:solidFill>
+                <a:srgbClr val="8C4FFF"/>
+              </a:solidFill>
+            </a:ln>
+          </p:spPr>
+          <p:style>
+            <a:lnRef idx="2">
+              <a:schemeClr val="accent1">
+                <a:shade val="50000"/>
+              </a:schemeClr>
+            </a:lnRef>
+            <a:fillRef idx="1">
+              <a:schemeClr val="accent1"/>
+            </a:fillRef>
+            <a:effectRef idx="0">
+              <a:schemeClr val="accent1"/>
+            </a:effectRef>
+            <a:fontRef idx="minor">
+              <a:schemeClr val="lt1"/>
+            </a:fontRef>
+          </p:style>
+          <p:txBody>
+            <a:bodyPr lIns="502920" tIns="91440"/>
+            <a:lstStyle/>
+            <a:p>
+              <a:pPr eaLnBrk="1" fontAlgn="auto" hangingPunct="1">
+                <a:spcBef>
+                  <a:spcPts val="0"/>
+                </a:spcBef>
+                <a:spcAft>
+                  <a:spcPts val="0"/>
+                </a:spcAft>
+                <a:defRPr/>
+              </a:pPr>
+              <a:endParaRPr lang="en-US" sz="1200" dirty="0">
                 <a:ln w="0"/>
                 <a:solidFill>
-                  <a:srgbClr val="8C4FFF"/>
+                  <a:schemeClr val="tx1"/>
                 </a:solidFill>
                 <a:latin typeface="Arial" panose="020B0604020202020204" pitchFamily="34" charset="0"/>
                 <a:cs typeface="Arial" panose="020B0604020202020204" pitchFamily="34" charset="0"/>
-              </a:defRPr>
-            </a:lvl1pPr>
-          </a:lstStyle>
-          <a:p>
-            <a:r>
-              <a:rPr lang="en-US" altLang="en-US" dirty="0"/>
-              <a:t>Elastic Load Balancing</a:t>
-            </a:r>
-          </a:p>
-        </p:txBody>
-      </p:sp>
+              </a:endParaRPr>
+            </a:p>
+          </p:txBody>
+        </p:sp>
+        <p:sp>
+          <p:nvSpPr>
+            <p:cNvPr id="19" name="TextBox 18">
+              <a:extLst>
+                <a:ext uri="{FF2B5EF4-FFF2-40B4-BE49-F238E27FC236}">
+                  <a16:creationId xmlns:a16="http://schemas.microsoft.com/office/drawing/2014/main" id="{4F54A344-B603-BFFA-2EF3-1CB5DBA309E7}"/>
+                </a:ext>
+              </a:extLst>
+            </p:cNvPr>
+            <p:cNvSpPr txBox="1"/>
+            <p:nvPr/>
+          </p:nvSpPr>
+          <p:spPr>
+            <a:xfrm>
+              <a:off x="914716" y="1952948"/>
+              <a:ext cx="1417376" cy="246221"/>
+            </a:xfrm>
+            <a:prstGeom prst="rect">
+              <a:avLst/>
+            </a:prstGeom>
+          </p:spPr>
+          <p:txBody>
+            <a:bodyPr wrap="none" rtlCol="0">
+              <a:spAutoFit/>
+            </a:bodyPr>
+            <a:lstStyle>
+              <a:defPPr>
+                <a:defRPr lang="pt-BR"/>
+              </a:defPPr>
+              <a:lvl1pPr>
+                <a:defRPr sz="1000">
+                  <a:ln w="0"/>
+                  <a:solidFill>
+                    <a:srgbClr val="8C4FFF"/>
+                  </a:solidFill>
+                  <a:latin typeface="Arial" panose="020B0604020202020204" pitchFamily="34" charset="0"/>
+                  <a:cs typeface="Arial" panose="020B0604020202020204" pitchFamily="34" charset="0"/>
+                </a:defRPr>
+              </a:lvl1pPr>
+            </a:lstStyle>
+            <a:p>
+              <a:r>
+                <a:rPr lang="en-US" dirty="0"/>
+                <a:t>[</a:t>
+              </a:r>
+              <a:r>
+                <a:rPr lang="en-US" dirty="0" err="1"/>
+                <a:t>Infraestructure</a:t>
+              </a:r>
+              <a:r>
+                <a:rPr lang="en-US" dirty="0"/>
+                <a:t> Node]</a:t>
+              </a:r>
+            </a:p>
+          </p:txBody>
+        </p:sp>
+        <p:sp>
+          <p:nvSpPr>
+            <p:cNvPr id="29" name="TextBox 28">
+              <a:extLst>
+                <a:ext uri="{FF2B5EF4-FFF2-40B4-BE49-F238E27FC236}">
+                  <a16:creationId xmlns:a16="http://schemas.microsoft.com/office/drawing/2014/main" id="{94952A50-4362-E64E-8287-F1904C786D91}"/>
+                </a:ext>
+              </a:extLst>
+            </p:cNvPr>
+            <p:cNvSpPr txBox="1"/>
+            <p:nvPr/>
+          </p:nvSpPr>
+          <p:spPr>
+            <a:xfrm>
+              <a:off x="629462" y="2242509"/>
+              <a:ext cx="1923635" cy="600164"/>
+            </a:xfrm>
+            <a:prstGeom prst="rect">
+              <a:avLst/>
+            </a:prstGeom>
+            <a:noFill/>
+          </p:spPr>
+          <p:txBody>
+            <a:bodyPr wrap="square" rtlCol="0">
+              <a:spAutoFit/>
+            </a:bodyPr>
+            <a:lstStyle/>
+            <a:p>
+              <a:pPr algn="ctr"/>
+              <a:r>
+                <a:rPr lang="pt-BR" sz="1100" dirty="0"/>
+                <a:t>Distribui automaticamente entrada de tráfico na aplicação</a:t>
+              </a:r>
+            </a:p>
+          </p:txBody>
+        </p:sp>
+        <p:pic>
+          <p:nvPicPr>
+            <p:cNvPr id="58" name="Graphic 6" descr="Elastic Load Balancing service icon.">
+              <a:extLst>
+                <a:ext uri="{FF2B5EF4-FFF2-40B4-BE49-F238E27FC236}">
+                  <a16:creationId xmlns:a16="http://schemas.microsoft.com/office/drawing/2014/main" id="{2B38ECD1-5A25-08B8-866D-A3E9280E8069}"/>
+                </a:ext>
+              </a:extLst>
+            </p:cNvPr>
+            <p:cNvPicPr>
+              <a:picLocks noChangeAspect="1" noChangeArrowheads="1"/>
+            </p:cNvPicPr>
+            <p:nvPr/>
+          </p:nvPicPr>
+          <p:blipFill>
+            <a:blip r:embed="rId12">
+              <a:extLst>
+                <a:ext uri="{96DAC541-7B7A-43D3-8B79-37D633B846F1}">
+                  <asvg:svgBlip xmlns:asvg="http://schemas.microsoft.com/office/drawing/2016/SVG/main" r:embed="rId13"/>
+                </a:ext>
+              </a:extLst>
+            </a:blip>
+            <a:srcRect/>
+            <a:stretch/>
+          </p:blipFill>
+          <p:spPr bwMode="auto">
+            <a:xfrm>
+              <a:off x="1394804" y="2950242"/>
+              <a:ext cx="457200" cy="457200"/>
+            </a:xfrm>
+            <a:prstGeom prst="rect">
+              <a:avLst/>
+            </a:prstGeom>
+            <a:extLst>
+              <a:ext uri="{909E8E84-426E-40DD-AFC4-6F175D3DCCD1}">
+                <a14:hiddenFill xmlns:a14="http://schemas.microsoft.com/office/drawing/2010/main">
+                  <a:solidFill>
+                    <a:srgbClr val="FFFFFF"/>
+                  </a:solidFill>
+                </a14:hiddenFill>
+              </a:ext>
+              <a:ext uri="{91240B29-F687-4F45-9708-019B960494DF}">
+                <a14:hiddenLine xmlns:a14="http://schemas.microsoft.com/office/drawing/2010/main" w="9525">
+                  <a:solidFill>
+                    <a:srgbClr val="000000"/>
+                  </a:solidFill>
+                  <a:miter lim="800000"/>
+                  <a:headEnd/>
+                  <a:tailEnd/>
+                </a14:hiddenLine>
+              </a:ext>
+            </a:extLst>
+          </p:spPr>
+        </p:pic>
+        <p:sp>
+          <p:nvSpPr>
+            <p:cNvPr id="59" name="TextBox 12">
+              <a:extLst>
+                <a:ext uri="{FF2B5EF4-FFF2-40B4-BE49-F238E27FC236}">
+                  <a16:creationId xmlns:a16="http://schemas.microsoft.com/office/drawing/2014/main" id="{E4C1E052-DD7D-7159-AA6B-C5A0784691B0}"/>
+                </a:ext>
+              </a:extLst>
+            </p:cNvPr>
+            <p:cNvSpPr txBox="1">
+              <a:spLocks noChangeArrowheads="1"/>
+            </p:cNvSpPr>
+            <p:nvPr/>
+          </p:nvSpPr>
+          <p:spPr bwMode="auto">
+            <a:xfrm>
+              <a:off x="641209" y="1740280"/>
+              <a:ext cx="1871025" cy="276999"/>
+            </a:xfrm>
+            <a:prstGeom prst="rect">
+              <a:avLst/>
+            </a:prstGeom>
+          </p:spPr>
+          <p:txBody>
+            <a:bodyPr wrap="none" rtlCol="0">
+              <a:spAutoFit/>
+            </a:bodyPr>
+            <a:lstStyle>
+              <a:defPPr>
+                <a:defRPr lang="pt-BR"/>
+              </a:defPPr>
+              <a:lvl1pPr>
+                <a:defRPr sz="1200" b="1">
+                  <a:ln w="0"/>
+                  <a:solidFill>
+                    <a:srgbClr val="8C4FFF"/>
+                  </a:solidFill>
+                  <a:latin typeface="Arial" panose="020B0604020202020204" pitchFamily="34" charset="0"/>
+                  <a:cs typeface="Arial" panose="020B0604020202020204" pitchFamily="34" charset="0"/>
+                </a:defRPr>
+              </a:lvl1pPr>
+            </a:lstStyle>
+            <a:p>
+              <a:r>
+                <a:rPr lang="en-US" altLang="en-US" dirty="0"/>
+                <a:t>Elastic Load Balancing</a:t>
+              </a:r>
+            </a:p>
+          </p:txBody>
+        </p:sp>
+      </p:grpSp>
       <p:cxnSp>
         <p:nvCxnSpPr>
           <p:cNvPr id="60" name="Straight Arrow Connector 59">
@@ -6472,8 +6615,8 @@
         </p:nvCxnSpPr>
         <p:spPr>
           <a:xfrm flipV="1">
-            <a:off x="1576722" y="3521705"/>
-            <a:ext cx="0" cy="599237"/>
+            <a:off x="1576722" y="3249266"/>
+            <a:ext cx="9191" cy="871676"/>
           </a:xfrm>
           <a:prstGeom prst="straightConnector1">
             <a:avLst/>
@@ -6515,7 +6658,7 @@
         </p:nvSpPr>
         <p:spPr>
           <a:xfrm>
-            <a:off x="6651990" y="4571242"/>
+            <a:off x="-4378419" y="5743058"/>
             <a:ext cx="1699881" cy="600164"/>
           </a:xfrm>
           <a:prstGeom prst="rect">
@@ -6545,6 +6688,1069 @@
           </a:p>
         </p:txBody>
       </p:sp>
+      <p:sp>
+        <p:nvSpPr>
+          <p:cNvPr id="5" name="Rectangle 79">
+            <a:extLst>
+              <a:ext uri="{FF2B5EF4-FFF2-40B4-BE49-F238E27FC236}">
+                <a16:creationId xmlns:a16="http://schemas.microsoft.com/office/drawing/2014/main" id="{53A56C97-E6B3-33FD-1505-FD2927DD07BC}"/>
+              </a:ext>
+            </a:extLst>
+          </p:cNvPr>
+          <p:cNvSpPr/>
+          <p:nvPr/>
+        </p:nvSpPr>
+        <p:spPr>
+          <a:xfrm>
+            <a:off x="4197888" y="1052065"/>
+            <a:ext cx="4569745" cy="4939280"/>
+          </a:xfrm>
+          <a:prstGeom prst="rect">
+            <a:avLst/>
+          </a:prstGeom>
+          <a:noFill/>
+          <a:ln w="15875">
+            <a:solidFill>
+              <a:srgbClr val="ED7100"/>
+            </a:solidFill>
+          </a:ln>
+        </p:spPr>
+        <p:style>
+          <a:lnRef idx="2">
+            <a:schemeClr val="accent1">
+              <a:shade val="50000"/>
+            </a:schemeClr>
+          </a:lnRef>
+          <a:fillRef idx="1">
+            <a:schemeClr val="accent1"/>
+          </a:fillRef>
+          <a:effectRef idx="0">
+            <a:schemeClr val="accent1"/>
+          </a:effectRef>
+          <a:fontRef idx="minor">
+            <a:schemeClr val="lt1"/>
+          </a:fontRef>
+        </p:style>
+        <p:txBody>
+          <a:bodyPr lIns="502920" tIns="91440"/>
+          <a:lstStyle/>
+          <a:p>
+            <a:pPr eaLnBrk="1" fontAlgn="auto" hangingPunct="1">
+              <a:spcBef>
+                <a:spcPts val="0"/>
+              </a:spcBef>
+              <a:spcAft>
+                <a:spcPts val="0"/>
+              </a:spcAft>
+              <a:defRPr/>
+            </a:pPr>
+            <a:endParaRPr lang="en-US" sz="1200" dirty="0">
+              <a:ln w="0"/>
+              <a:solidFill>
+                <a:schemeClr val="tx1"/>
+              </a:solidFill>
+              <a:latin typeface="Arial" panose="020B0604020202020204" pitchFamily="34" charset="0"/>
+              <a:cs typeface="Arial" panose="020B0604020202020204" pitchFamily="34" charset="0"/>
+            </a:endParaRPr>
+          </a:p>
+        </p:txBody>
+      </p:sp>
+      <p:pic>
+        <p:nvPicPr>
+          <p:cNvPr id="6" name="Graphic 80" descr="EC2 instance contents group icon. ">
+            <a:extLst>
+              <a:ext uri="{FF2B5EF4-FFF2-40B4-BE49-F238E27FC236}">
+                <a16:creationId xmlns:a16="http://schemas.microsoft.com/office/drawing/2014/main" id="{673F41ED-B7CA-0008-2A48-D612E318EFD4}"/>
+              </a:ext>
+            </a:extLst>
+          </p:cNvPr>
+          <p:cNvPicPr>
+            <a:picLocks noChangeAspect="1"/>
+          </p:cNvPicPr>
+          <p:nvPr/>
+        </p:nvPicPr>
+        <p:blipFill>
+          <a:blip r:embed="rId4">
+            <a:extLst>
+              <a:ext uri="{96DAC541-7B7A-43D3-8B79-37D633B846F1}">
+                <asvg:svgBlip xmlns:asvg="http://schemas.microsoft.com/office/drawing/2016/SVG/main" r:embed="rId5"/>
+              </a:ext>
+            </a:extLst>
+          </a:blip>
+          <a:srcRect/>
+          <a:stretch/>
+        </p:blipFill>
+        <p:spPr>
+          <a:xfrm>
+            <a:off x="4211159" y="5610345"/>
+            <a:ext cx="381000" cy="381000"/>
+          </a:xfrm>
+          <a:prstGeom prst="rect">
+            <a:avLst/>
+          </a:prstGeom>
+        </p:spPr>
+      </p:pic>
+      <p:sp>
+        <p:nvSpPr>
+          <p:cNvPr id="7" name="TextBox 6">
+            <a:extLst>
+              <a:ext uri="{FF2B5EF4-FFF2-40B4-BE49-F238E27FC236}">
+                <a16:creationId xmlns:a16="http://schemas.microsoft.com/office/drawing/2014/main" id="{BBC2839C-410F-15D7-90C1-6E7BC469F629}"/>
+              </a:ext>
+            </a:extLst>
+          </p:cNvPr>
+          <p:cNvSpPr txBox="1"/>
+          <p:nvPr/>
+        </p:nvSpPr>
+        <p:spPr>
+          <a:xfrm>
+            <a:off x="4597380" y="5703150"/>
+            <a:ext cx="1124026" cy="276999"/>
+          </a:xfrm>
+          <a:prstGeom prst="rect">
+            <a:avLst/>
+          </a:prstGeom>
+          <a:noFill/>
+        </p:spPr>
+        <p:txBody>
+          <a:bodyPr wrap="square" rtlCol="0">
+            <a:spAutoFit/>
+          </a:bodyPr>
+          <a:lstStyle/>
+          <a:p>
+            <a:r>
+              <a:rPr lang="en-US" sz="1200" b="1" dirty="0">
+                <a:ln w="0"/>
+                <a:solidFill>
+                  <a:srgbClr val="ED7100"/>
+                </a:solidFill>
+                <a:latin typeface="Arial" panose="020B0604020202020204" pitchFamily="34" charset="0"/>
+                <a:cs typeface="Arial" panose="020B0604020202020204" pitchFamily="34" charset="0"/>
+              </a:rPr>
+              <a:t>Amazon EC2</a:t>
+            </a:r>
+          </a:p>
+        </p:txBody>
+      </p:sp>
+      <p:sp>
+        <p:nvSpPr>
+          <p:cNvPr id="14" name="Rectangle 79">
+            <a:extLst>
+              <a:ext uri="{FF2B5EF4-FFF2-40B4-BE49-F238E27FC236}">
+                <a16:creationId xmlns:a16="http://schemas.microsoft.com/office/drawing/2014/main" id="{6CC5EB98-DD41-3396-F63E-F1A708229C1F}"/>
+              </a:ext>
+            </a:extLst>
+          </p:cNvPr>
+          <p:cNvSpPr/>
+          <p:nvPr/>
+        </p:nvSpPr>
+        <p:spPr>
+          <a:xfrm>
+            <a:off x="4312845" y="1318064"/>
+            <a:ext cx="4266878" cy="4025424"/>
+          </a:xfrm>
+          <a:prstGeom prst="rect">
+            <a:avLst/>
+          </a:prstGeom>
+          <a:noFill/>
+          <a:ln w="15875">
+            <a:solidFill>
+              <a:schemeClr val="accent1"/>
+            </a:solidFill>
+          </a:ln>
+        </p:spPr>
+        <p:style>
+          <a:lnRef idx="2">
+            <a:schemeClr val="accent1">
+              <a:shade val="50000"/>
+            </a:schemeClr>
+          </a:lnRef>
+          <a:fillRef idx="1">
+            <a:schemeClr val="accent1"/>
+          </a:fillRef>
+          <a:effectRef idx="0">
+            <a:schemeClr val="accent1"/>
+          </a:effectRef>
+          <a:fontRef idx="minor">
+            <a:schemeClr val="lt1"/>
+          </a:fontRef>
+        </p:style>
+        <p:txBody>
+          <a:bodyPr lIns="502920" tIns="91440"/>
+          <a:lstStyle/>
+          <a:p>
+            <a:pPr eaLnBrk="1" fontAlgn="auto" hangingPunct="1">
+              <a:spcBef>
+                <a:spcPts val="0"/>
+              </a:spcBef>
+              <a:spcAft>
+                <a:spcPts val="0"/>
+              </a:spcAft>
+              <a:defRPr/>
+            </a:pPr>
+            <a:endParaRPr lang="en-US" sz="1200" dirty="0">
+              <a:ln w="0"/>
+              <a:solidFill>
+                <a:schemeClr val="tx1"/>
+              </a:solidFill>
+              <a:latin typeface="Arial" panose="020B0604020202020204" pitchFamily="34" charset="0"/>
+              <a:cs typeface="Arial" panose="020B0604020202020204" pitchFamily="34" charset="0"/>
+            </a:endParaRPr>
+          </a:p>
+        </p:txBody>
+      </p:sp>
+      <p:grpSp>
+        <p:nvGrpSpPr>
+          <p:cNvPr id="67" name="Group 66">
+            <a:extLst>
+              <a:ext uri="{FF2B5EF4-FFF2-40B4-BE49-F238E27FC236}">
+                <a16:creationId xmlns:a16="http://schemas.microsoft.com/office/drawing/2014/main" id="{26563F42-A05A-15F2-29FC-A7A22001FD86}"/>
+              </a:ext>
+            </a:extLst>
+          </p:cNvPr>
+          <p:cNvGrpSpPr/>
+          <p:nvPr/>
+        </p:nvGrpSpPr>
+        <p:grpSpPr>
+          <a:xfrm>
+            <a:off x="4367181" y="4952723"/>
+            <a:ext cx="1513035" cy="388750"/>
+            <a:chOff x="12838206" y="5717930"/>
+            <a:chExt cx="1513035" cy="388750"/>
+          </a:xfrm>
+        </p:grpSpPr>
+        <p:pic>
+          <p:nvPicPr>
+            <p:cNvPr id="1026" name="Picture 2" descr="Docker, logo, logos icon - Free download on Iconfinder">
+              <a:extLst>
+                <a:ext uri="{FF2B5EF4-FFF2-40B4-BE49-F238E27FC236}">
+                  <a16:creationId xmlns:a16="http://schemas.microsoft.com/office/drawing/2014/main" id="{8D5994DC-74FC-70EA-E380-03BCD1715DE6}"/>
+                </a:ext>
+              </a:extLst>
+            </p:cNvPr>
+            <p:cNvPicPr>
+              <a:picLocks noChangeAspect="1" noChangeArrowheads="1"/>
+            </p:cNvPicPr>
+            <p:nvPr/>
+          </p:nvPicPr>
+          <p:blipFill>
+            <a:blip r:embed="rId14">
+              <a:extLst>
+                <a:ext uri="{28A0092B-C50C-407E-A947-70E740481C1C}">
+                  <a14:useLocalDpi xmlns:a14="http://schemas.microsoft.com/office/drawing/2010/main" val="0"/>
+                </a:ext>
+              </a:extLst>
+            </a:blip>
+            <a:srcRect/>
+            <a:stretch>
+              <a:fillRect/>
+            </a:stretch>
+          </p:blipFill>
+          <p:spPr bwMode="auto">
+            <a:xfrm>
+              <a:off x="12838206" y="5717930"/>
+              <a:ext cx="388750" cy="388750"/>
+            </a:xfrm>
+            <a:prstGeom prst="rect">
+              <a:avLst/>
+            </a:prstGeom>
+            <a:noFill/>
+            <a:extLst>
+              <a:ext uri="{909E8E84-426E-40DD-AFC4-6F175D3DCCD1}">
+                <a14:hiddenFill xmlns:a14="http://schemas.microsoft.com/office/drawing/2010/main">
+                  <a:solidFill>
+                    <a:srgbClr val="FFFFFF"/>
+                  </a:solidFill>
+                </a14:hiddenFill>
+              </a:ext>
+            </a:extLst>
+          </p:spPr>
+        </p:pic>
+        <p:sp>
+          <p:nvSpPr>
+            <p:cNvPr id="15" name="TextBox 14">
+              <a:extLst>
+                <a:ext uri="{FF2B5EF4-FFF2-40B4-BE49-F238E27FC236}">
+                  <a16:creationId xmlns:a16="http://schemas.microsoft.com/office/drawing/2014/main" id="{11D5BE02-C8B5-F04B-7CD7-2B2EE9AEA103}"/>
+                </a:ext>
+              </a:extLst>
+            </p:cNvPr>
+            <p:cNvSpPr txBox="1"/>
+            <p:nvPr/>
+          </p:nvSpPr>
+          <p:spPr>
+            <a:xfrm>
+              <a:off x="13227215" y="5758973"/>
+              <a:ext cx="1124026" cy="276999"/>
+            </a:xfrm>
+            <a:prstGeom prst="rect">
+              <a:avLst/>
+            </a:prstGeom>
+            <a:noFill/>
+          </p:spPr>
+          <p:txBody>
+            <a:bodyPr wrap="square" rtlCol="0">
+              <a:spAutoFit/>
+            </a:bodyPr>
+            <a:lstStyle/>
+            <a:p>
+              <a:r>
+                <a:rPr lang="en-US" sz="1200" b="1" dirty="0">
+                  <a:ln w="0"/>
+                  <a:solidFill>
+                    <a:schemeClr val="tx2">
+                      <a:lumMod val="75000"/>
+                      <a:lumOff val="25000"/>
+                    </a:schemeClr>
+                  </a:solidFill>
+                  <a:latin typeface="Arial" panose="020B0604020202020204" pitchFamily="34" charset="0"/>
+                  <a:cs typeface="Arial" panose="020B0604020202020204" pitchFamily="34" charset="0"/>
+                </a:rPr>
+                <a:t>Docker</a:t>
+              </a:r>
+            </a:p>
+          </p:txBody>
+        </p:sp>
+      </p:grpSp>
+      <p:grpSp>
+        <p:nvGrpSpPr>
+          <p:cNvPr id="77" name="Group 76">
+            <a:extLst>
+              <a:ext uri="{FF2B5EF4-FFF2-40B4-BE49-F238E27FC236}">
+                <a16:creationId xmlns:a16="http://schemas.microsoft.com/office/drawing/2014/main" id="{40267A71-7801-4EF1-F079-62BB9A880253}"/>
+              </a:ext>
+            </a:extLst>
+          </p:cNvPr>
+          <p:cNvGrpSpPr/>
+          <p:nvPr/>
+        </p:nvGrpSpPr>
+        <p:grpSpPr>
+          <a:xfrm>
+            <a:off x="6661391" y="1576112"/>
+            <a:ext cx="1772104" cy="1305009"/>
+            <a:chOff x="6597891" y="1633262"/>
+            <a:chExt cx="1772104" cy="1305009"/>
+          </a:xfrm>
+        </p:grpSpPr>
+        <p:sp>
+          <p:nvSpPr>
+            <p:cNvPr id="17" name="TextBox 16">
+              <a:extLst>
+                <a:ext uri="{FF2B5EF4-FFF2-40B4-BE49-F238E27FC236}">
+                  <a16:creationId xmlns:a16="http://schemas.microsoft.com/office/drawing/2014/main" id="{E3247BEA-79E7-4022-F2A1-91768E72B927}"/>
+                </a:ext>
+              </a:extLst>
+            </p:cNvPr>
+            <p:cNvSpPr txBox="1"/>
+            <p:nvPr/>
+          </p:nvSpPr>
+          <p:spPr>
+            <a:xfrm>
+              <a:off x="6637661" y="1823582"/>
+              <a:ext cx="1661032" cy="215444"/>
+            </a:xfrm>
+            <a:prstGeom prst="rect">
+              <a:avLst/>
+            </a:prstGeom>
+            <a:noFill/>
+          </p:spPr>
+          <p:txBody>
+            <a:bodyPr wrap="none" rtlCol="0">
+              <a:spAutoFit/>
+            </a:bodyPr>
+            <a:lstStyle/>
+            <a:p>
+              <a:r>
+                <a:rPr lang="en-US" sz="800" dirty="0">
+                  <a:ln w="0"/>
+                  <a:latin typeface="Arial" panose="020B0604020202020204" pitchFamily="34" charset="0"/>
+                  <a:cs typeface="Arial" panose="020B0604020202020204" pitchFamily="34" charset="0"/>
+                </a:rPr>
+                <a:t>[Container: Kotlin e Spring Boot]</a:t>
+              </a:r>
+            </a:p>
+          </p:txBody>
+        </p:sp>
+        <p:sp>
+          <p:nvSpPr>
+            <p:cNvPr id="22" name="Rectangle 79">
+              <a:extLst>
+                <a:ext uri="{FF2B5EF4-FFF2-40B4-BE49-F238E27FC236}">
+                  <a16:creationId xmlns:a16="http://schemas.microsoft.com/office/drawing/2014/main" id="{D3407A94-BA0B-0FB4-771A-A6ED9A519A2F}"/>
+                </a:ext>
+              </a:extLst>
+            </p:cNvPr>
+            <p:cNvSpPr/>
+            <p:nvPr/>
+          </p:nvSpPr>
+          <p:spPr>
+            <a:xfrm>
+              <a:off x="6597891" y="1636523"/>
+              <a:ext cx="1770166" cy="1301748"/>
+            </a:xfrm>
+            <a:prstGeom prst="rect">
+              <a:avLst/>
+            </a:prstGeom>
+            <a:noFill/>
+            <a:ln w="15875">
+              <a:solidFill>
+                <a:schemeClr val="bg1">
+                  <a:lumMod val="75000"/>
+                </a:schemeClr>
+              </a:solidFill>
+            </a:ln>
+          </p:spPr>
+          <p:style>
+            <a:lnRef idx="2">
+              <a:schemeClr val="accent1">
+                <a:shade val="50000"/>
+              </a:schemeClr>
+            </a:lnRef>
+            <a:fillRef idx="1">
+              <a:schemeClr val="accent1"/>
+            </a:fillRef>
+            <a:effectRef idx="0">
+              <a:schemeClr val="accent1"/>
+            </a:effectRef>
+            <a:fontRef idx="minor">
+              <a:schemeClr val="lt1"/>
+            </a:fontRef>
+          </p:style>
+          <p:txBody>
+            <a:bodyPr lIns="502920" tIns="91440"/>
+            <a:lstStyle/>
+            <a:p>
+              <a:pPr eaLnBrk="1" fontAlgn="auto" hangingPunct="1">
+                <a:spcBef>
+                  <a:spcPts val="0"/>
+                </a:spcBef>
+                <a:spcAft>
+                  <a:spcPts val="0"/>
+                </a:spcAft>
+                <a:defRPr/>
+              </a:pPr>
+              <a:endParaRPr lang="en-US" sz="1200" dirty="0">
+                <a:ln w="0"/>
+                <a:solidFill>
+                  <a:schemeClr val="tx1"/>
+                </a:solidFill>
+                <a:latin typeface="Arial" panose="020B0604020202020204" pitchFamily="34" charset="0"/>
+                <a:cs typeface="Arial" panose="020B0604020202020204" pitchFamily="34" charset="0"/>
+              </a:endParaRPr>
+            </a:p>
+          </p:txBody>
+        </p:sp>
+        <p:sp>
+          <p:nvSpPr>
+            <p:cNvPr id="24" name="TextBox 23">
+              <a:extLst>
+                <a:ext uri="{FF2B5EF4-FFF2-40B4-BE49-F238E27FC236}">
+                  <a16:creationId xmlns:a16="http://schemas.microsoft.com/office/drawing/2014/main" id="{D04DE7C9-0DD9-65D0-1440-4AE03EC135E8}"/>
+                </a:ext>
+              </a:extLst>
+            </p:cNvPr>
+            <p:cNvSpPr txBox="1"/>
+            <p:nvPr/>
+          </p:nvSpPr>
+          <p:spPr>
+            <a:xfrm>
+              <a:off x="6816419" y="1633262"/>
+              <a:ext cx="1384866" cy="276999"/>
+            </a:xfrm>
+            <a:prstGeom prst="rect">
+              <a:avLst/>
+            </a:prstGeom>
+            <a:noFill/>
+          </p:spPr>
+          <p:txBody>
+            <a:bodyPr wrap="none" rtlCol="0">
+              <a:spAutoFit/>
+            </a:bodyPr>
+            <a:lstStyle/>
+            <a:p>
+              <a:r>
+                <a:rPr lang="en-US" sz="1200" b="1" dirty="0">
+                  <a:ln w="0"/>
+                  <a:solidFill>
+                    <a:srgbClr val="ED7100"/>
+                  </a:solidFill>
+                  <a:latin typeface="Arial" panose="020B0604020202020204" pitchFamily="34" charset="0"/>
+                  <a:cs typeface="Arial" panose="020B0604020202020204" pitchFamily="34" charset="0"/>
+                </a:rPr>
+                <a:t>Web Application</a:t>
+              </a:r>
+            </a:p>
+          </p:txBody>
+        </p:sp>
+        <p:sp>
+          <p:nvSpPr>
+            <p:cNvPr id="30" name="TextBox 29">
+              <a:extLst>
+                <a:ext uri="{FF2B5EF4-FFF2-40B4-BE49-F238E27FC236}">
+                  <a16:creationId xmlns:a16="http://schemas.microsoft.com/office/drawing/2014/main" id="{A29D5961-A318-3119-0DE2-E8FAD47FAA2A}"/>
+                </a:ext>
+              </a:extLst>
+            </p:cNvPr>
+            <p:cNvSpPr txBox="1"/>
+            <p:nvPr/>
+          </p:nvSpPr>
+          <p:spPr>
+            <a:xfrm>
+              <a:off x="6670114" y="2068892"/>
+              <a:ext cx="1699881" cy="600164"/>
+            </a:xfrm>
+            <a:prstGeom prst="rect">
+              <a:avLst/>
+            </a:prstGeom>
+            <a:noFill/>
+          </p:spPr>
+          <p:txBody>
+            <a:bodyPr wrap="square" rtlCol="0">
+              <a:spAutoFit/>
+            </a:bodyPr>
+            <a:lstStyle/>
+            <a:p>
+              <a:pPr algn="ctr"/>
+              <a:r>
+                <a:rPr lang="pt-BR" sz="1100" dirty="0"/>
+                <a:t>Instância com o Back-</a:t>
+              </a:r>
+              <a:r>
+                <a:rPr lang="pt-BR" sz="1100" dirty="0" err="1"/>
+                <a:t>end</a:t>
+              </a:r>
+              <a:r>
+                <a:rPr lang="pt-BR" sz="1100" dirty="0"/>
+                <a:t> responsável por toda a lógica do sistema</a:t>
+              </a:r>
+            </a:p>
+          </p:txBody>
+        </p:sp>
+      </p:grpSp>
+      <p:grpSp>
+        <p:nvGrpSpPr>
+          <p:cNvPr id="75" name="Group 74">
+            <a:extLst>
+              <a:ext uri="{FF2B5EF4-FFF2-40B4-BE49-F238E27FC236}">
+                <a16:creationId xmlns:a16="http://schemas.microsoft.com/office/drawing/2014/main" id="{09AE5A84-17F6-2871-5917-970DCEA35313}"/>
+              </a:ext>
+            </a:extLst>
+          </p:cNvPr>
+          <p:cNvGrpSpPr/>
+          <p:nvPr/>
+        </p:nvGrpSpPr>
+        <p:grpSpPr>
+          <a:xfrm>
+            <a:off x="4410799" y="1584891"/>
+            <a:ext cx="1770166" cy="1305009"/>
+            <a:chOff x="4349712" y="1643094"/>
+            <a:chExt cx="1770166" cy="1305009"/>
+          </a:xfrm>
+        </p:grpSpPr>
+        <p:sp>
+          <p:nvSpPr>
+            <p:cNvPr id="31" name="Rectangle 79">
+              <a:extLst>
+                <a:ext uri="{FF2B5EF4-FFF2-40B4-BE49-F238E27FC236}">
+                  <a16:creationId xmlns:a16="http://schemas.microsoft.com/office/drawing/2014/main" id="{423D7517-0597-51F8-9D8B-61E059963FC5}"/>
+                </a:ext>
+              </a:extLst>
+            </p:cNvPr>
+            <p:cNvSpPr/>
+            <p:nvPr/>
+          </p:nvSpPr>
+          <p:spPr>
+            <a:xfrm>
+              <a:off x="4349712" y="1646355"/>
+              <a:ext cx="1770166" cy="1301748"/>
+            </a:xfrm>
+            <a:prstGeom prst="rect">
+              <a:avLst/>
+            </a:prstGeom>
+            <a:noFill/>
+            <a:ln w="15875">
+              <a:solidFill>
+                <a:schemeClr val="bg1">
+                  <a:lumMod val="75000"/>
+                </a:schemeClr>
+              </a:solidFill>
+            </a:ln>
+          </p:spPr>
+          <p:style>
+            <a:lnRef idx="2">
+              <a:schemeClr val="accent1">
+                <a:shade val="50000"/>
+              </a:schemeClr>
+            </a:lnRef>
+            <a:fillRef idx="1">
+              <a:schemeClr val="accent1"/>
+            </a:fillRef>
+            <a:effectRef idx="0">
+              <a:schemeClr val="accent1"/>
+            </a:effectRef>
+            <a:fontRef idx="minor">
+              <a:schemeClr val="lt1"/>
+            </a:fontRef>
+          </p:style>
+          <p:txBody>
+            <a:bodyPr lIns="502920" tIns="91440"/>
+            <a:lstStyle/>
+            <a:p>
+              <a:pPr eaLnBrk="1" fontAlgn="auto" hangingPunct="1">
+                <a:spcBef>
+                  <a:spcPts val="0"/>
+                </a:spcBef>
+                <a:spcAft>
+                  <a:spcPts val="0"/>
+                </a:spcAft>
+                <a:defRPr/>
+              </a:pPr>
+              <a:endParaRPr lang="en-US" sz="1200" dirty="0">
+                <a:ln w="0"/>
+                <a:solidFill>
+                  <a:schemeClr val="tx1"/>
+                </a:solidFill>
+                <a:latin typeface="Arial" panose="020B0604020202020204" pitchFamily="34" charset="0"/>
+                <a:cs typeface="Arial" panose="020B0604020202020204" pitchFamily="34" charset="0"/>
+              </a:endParaRPr>
+            </a:p>
+          </p:txBody>
+        </p:sp>
+        <p:sp>
+          <p:nvSpPr>
+            <p:cNvPr id="61" name="TextBox 60">
+              <a:extLst>
+                <a:ext uri="{FF2B5EF4-FFF2-40B4-BE49-F238E27FC236}">
+                  <a16:creationId xmlns:a16="http://schemas.microsoft.com/office/drawing/2014/main" id="{7F0FCE74-ED3D-3E31-C8CC-D769CBA9B8C4}"/>
+                </a:ext>
+              </a:extLst>
+            </p:cNvPr>
+            <p:cNvSpPr txBox="1"/>
+            <p:nvPr/>
+          </p:nvSpPr>
+          <p:spPr>
+            <a:xfrm>
+              <a:off x="4568240" y="1643094"/>
+              <a:ext cx="1384866" cy="276999"/>
+            </a:xfrm>
+            <a:prstGeom prst="rect">
+              <a:avLst/>
+            </a:prstGeom>
+            <a:noFill/>
+          </p:spPr>
+          <p:txBody>
+            <a:bodyPr wrap="none" rtlCol="0">
+              <a:spAutoFit/>
+            </a:bodyPr>
+            <a:lstStyle/>
+            <a:p>
+              <a:r>
+                <a:rPr lang="en-US" sz="1200" b="1" dirty="0">
+                  <a:ln w="0"/>
+                  <a:solidFill>
+                    <a:srgbClr val="ED7100"/>
+                  </a:solidFill>
+                  <a:latin typeface="Arial" panose="020B0604020202020204" pitchFamily="34" charset="0"/>
+                  <a:cs typeface="Arial" panose="020B0604020202020204" pitchFamily="34" charset="0"/>
+                </a:rPr>
+                <a:t>Web Application</a:t>
+              </a:r>
+            </a:p>
+          </p:txBody>
+        </p:sp>
+        <p:sp>
+          <p:nvSpPr>
+            <p:cNvPr id="63" name="TextBox 62">
+              <a:extLst>
+                <a:ext uri="{FF2B5EF4-FFF2-40B4-BE49-F238E27FC236}">
+                  <a16:creationId xmlns:a16="http://schemas.microsoft.com/office/drawing/2014/main" id="{383AB197-322C-7111-B12E-39643FD71022}"/>
+                </a:ext>
+              </a:extLst>
+            </p:cNvPr>
+            <p:cNvSpPr txBox="1"/>
+            <p:nvPr/>
+          </p:nvSpPr>
+          <p:spPr>
+            <a:xfrm>
+              <a:off x="4415449" y="1826193"/>
+              <a:ext cx="1612942" cy="215444"/>
+            </a:xfrm>
+            <a:prstGeom prst="rect">
+              <a:avLst/>
+            </a:prstGeom>
+            <a:noFill/>
+          </p:spPr>
+          <p:txBody>
+            <a:bodyPr wrap="none" rtlCol="0">
+              <a:spAutoFit/>
+            </a:bodyPr>
+            <a:lstStyle/>
+            <a:p>
+              <a:r>
+                <a:rPr lang="en-US" sz="800" dirty="0">
+                  <a:ln w="0"/>
+                  <a:latin typeface="Arial" panose="020B0604020202020204" pitchFamily="34" charset="0"/>
+                  <a:cs typeface="Arial" panose="020B0604020202020204" pitchFamily="34" charset="0"/>
+                </a:rPr>
+                <a:t>[Container: React e JavaScript]</a:t>
+              </a:r>
+            </a:p>
+          </p:txBody>
+        </p:sp>
+        <p:sp>
+          <p:nvSpPr>
+            <p:cNvPr id="66" name="TextBox 65">
+              <a:extLst>
+                <a:ext uri="{FF2B5EF4-FFF2-40B4-BE49-F238E27FC236}">
+                  <a16:creationId xmlns:a16="http://schemas.microsoft.com/office/drawing/2014/main" id="{66AE83B0-5CDF-3644-C416-C7014F6D9DCF}"/>
+                </a:ext>
+              </a:extLst>
+            </p:cNvPr>
+            <p:cNvSpPr txBox="1"/>
+            <p:nvPr/>
+          </p:nvSpPr>
+          <p:spPr>
+            <a:xfrm>
+              <a:off x="4429944" y="2032603"/>
+              <a:ext cx="1675046" cy="769441"/>
+            </a:xfrm>
+            <a:prstGeom prst="rect">
+              <a:avLst/>
+            </a:prstGeom>
+            <a:noFill/>
+          </p:spPr>
+          <p:txBody>
+            <a:bodyPr wrap="square" rtlCol="0">
+              <a:spAutoFit/>
+            </a:bodyPr>
+            <a:lstStyle/>
+            <a:p>
+              <a:pPr algn="ctr"/>
+              <a:r>
+                <a:rPr lang="pt-BR" sz="1100" dirty="0"/>
+                <a:t>Front-</a:t>
+              </a:r>
+              <a:r>
+                <a:rPr lang="pt-BR" sz="1100" dirty="0" err="1"/>
+                <a:t>end</a:t>
+              </a:r>
+              <a:r>
+                <a:rPr lang="pt-BR" sz="1100" dirty="0"/>
+                <a:t> que permite os usuários visualizarem e interagirem com o sistema </a:t>
+              </a:r>
+            </a:p>
+          </p:txBody>
+        </p:sp>
+      </p:grpSp>
+      <p:grpSp>
+        <p:nvGrpSpPr>
+          <p:cNvPr id="78" name="Group 77">
+            <a:extLst>
+              <a:ext uri="{FF2B5EF4-FFF2-40B4-BE49-F238E27FC236}">
+                <a16:creationId xmlns:a16="http://schemas.microsoft.com/office/drawing/2014/main" id="{BA40A79E-DAE9-AEE2-990B-479C7D580736}"/>
+              </a:ext>
+            </a:extLst>
+          </p:cNvPr>
+          <p:cNvGrpSpPr/>
+          <p:nvPr/>
+        </p:nvGrpSpPr>
+        <p:grpSpPr>
+          <a:xfrm>
+            <a:off x="4426445" y="3462559"/>
+            <a:ext cx="1770166" cy="1305009"/>
+            <a:chOff x="4464545" y="3462559"/>
+            <a:chExt cx="1770166" cy="1305009"/>
+          </a:xfrm>
+        </p:grpSpPr>
+        <p:sp>
+          <p:nvSpPr>
+            <p:cNvPr id="69" name="Rectangle 79">
+              <a:extLst>
+                <a:ext uri="{FF2B5EF4-FFF2-40B4-BE49-F238E27FC236}">
+                  <a16:creationId xmlns:a16="http://schemas.microsoft.com/office/drawing/2014/main" id="{40CAC9EC-7E4F-3482-AFFA-F3317E31AA13}"/>
+                </a:ext>
+              </a:extLst>
+            </p:cNvPr>
+            <p:cNvSpPr/>
+            <p:nvPr/>
+          </p:nvSpPr>
+          <p:spPr>
+            <a:xfrm>
+              <a:off x="4464545" y="3465820"/>
+              <a:ext cx="1770166" cy="1301748"/>
+            </a:xfrm>
+            <a:prstGeom prst="rect">
+              <a:avLst/>
+            </a:prstGeom>
+            <a:noFill/>
+            <a:ln w="15875">
+              <a:solidFill>
+                <a:schemeClr val="bg1">
+                  <a:lumMod val="75000"/>
+                </a:schemeClr>
+              </a:solidFill>
+            </a:ln>
+          </p:spPr>
+          <p:style>
+            <a:lnRef idx="2">
+              <a:schemeClr val="accent1">
+                <a:shade val="50000"/>
+              </a:schemeClr>
+            </a:lnRef>
+            <a:fillRef idx="1">
+              <a:schemeClr val="accent1"/>
+            </a:fillRef>
+            <a:effectRef idx="0">
+              <a:schemeClr val="accent1"/>
+            </a:effectRef>
+            <a:fontRef idx="minor">
+              <a:schemeClr val="lt1"/>
+            </a:fontRef>
+          </p:style>
+          <p:txBody>
+            <a:bodyPr lIns="502920" tIns="91440"/>
+            <a:lstStyle/>
+            <a:p>
+              <a:pPr eaLnBrk="1" fontAlgn="auto" hangingPunct="1">
+                <a:spcBef>
+                  <a:spcPts val="0"/>
+                </a:spcBef>
+                <a:spcAft>
+                  <a:spcPts val="0"/>
+                </a:spcAft>
+                <a:defRPr/>
+              </a:pPr>
+              <a:endParaRPr lang="en-US" sz="1200" dirty="0">
+                <a:ln w="0"/>
+                <a:solidFill>
+                  <a:schemeClr val="tx1"/>
+                </a:solidFill>
+                <a:latin typeface="Arial" panose="020B0604020202020204" pitchFamily="34" charset="0"/>
+                <a:cs typeface="Arial" panose="020B0604020202020204" pitchFamily="34" charset="0"/>
+              </a:endParaRPr>
+            </a:p>
+          </p:txBody>
+        </p:sp>
+        <p:sp>
+          <p:nvSpPr>
+            <p:cNvPr id="70" name="TextBox 69">
+              <a:extLst>
+                <a:ext uri="{FF2B5EF4-FFF2-40B4-BE49-F238E27FC236}">
+                  <a16:creationId xmlns:a16="http://schemas.microsoft.com/office/drawing/2014/main" id="{41EF0E19-E6CA-61F7-0182-8FEA70969F21}"/>
+                </a:ext>
+              </a:extLst>
+            </p:cNvPr>
+            <p:cNvSpPr txBox="1"/>
+            <p:nvPr/>
+          </p:nvSpPr>
+          <p:spPr>
+            <a:xfrm>
+              <a:off x="4639531" y="3462559"/>
+              <a:ext cx="1384866" cy="276999"/>
+            </a:xfrm>
+            <a:prstGeom prst="rect">
+              <a:avLst/>
+            </a:prstGeom>
+            <a:noFill/>
+          </p:spPr>
+          <p:txBody>
+            <a:bodyPr wrap="none" rtlCol="0">
+              <a:spAutoFit/>
+            </a:bodyPr>
+            <a:lstStyle/>
+            <a:p>
+              <a:r>
+                <a:rPr lang="en-US" sz="1200" b="1" dirty="0">
+                  <a:ln w="0"/>
+                  <a:solidFill>
+                    <a:srgbClr val="ED7100"/>
+                  </a:solidFill>
+                  <a:latin typeface="Arial" panose="020B0604020202020204" pitchFamily="34" charset="0"/>
+                  <a:cs typeface="Arial" panose="020B0604020202020204" pitchFamily="34" charset="0"/>
+                </a:rPr>
+                <a:t>Web Application</a:t>
+              </a:r>
+            </a:p>
+          </p:txBody>
+        </p:sp>
+        <p:sp>
+          <p:nvSpPr>
+            <p:cNvPr id="72" name="TextBox 71">
+              <a:extLst>
+                <a:ext uri="{FF2B5EF4-FFF2-40B4-BE49-F238E27FC236}">
+                  <a16:creationId xmlns:a16="http://schemas.microsoft.com/office/drawing/2014/main" id="{F2C9B66C-653B-081F-5A5A-B8E3991F3428}"/>
+                </a:ext>
+              </a:extLst>
+            </p:cNvPr>
+            <p:cNvSpPr txBox="1"/>
+            <p:nvPr/>
+          </p:nvSpPr>
+          <p:spPr>
+            <a:xfrm>
+              <a:off x="4839915" y="3642740"/>
+              <a:ext cx="1069524" cy="215444"/>
+            </a:xfrm>
+            <a:prstGeom prst="rect">
+              <a:avLst/>
+            </a:prstGeom>
+            <a:noFill/>
+          </p:spPr>
+          <p:txBody>
+            <a:bodyPr wrap="none" rtlCol="0">
+              <a:spAutoFit/>
+            </a:bodyPr>
+            <a:lstStyle/>
+            <a:p>
+              <a:r>
+                <a:rPr lang="en-US" sz="800" dirty="0">
+                  <a:ln w="0"/>
+                  <a:latin typeface="Arial" panose="020B0604020202020204" pitchFamily="34" charset="0"/>
+                  <a:cs typeface="Arial" panose="020B0604020202020204" pitchFamily="34" charset="0"/>
+                </a:rPr>
+                <a:t>[Container: Python]</a:t>
+              </a:r>
+            </a:p>
+          </p:txBody>
+        </p:sp>
+        <p:sp>
+          <p:nvSpPr>
+            <p:cNvPr id="73" name="TextBox 72">
+              <a:extLst>
+                <a:ext uri="{FF2B5EF4-FFF2-40B4-BE49-F238E27FC236}">
+                  <a16:creationId xmlns:a16="http://schemas.microsoft.com/office/drawing/2014/main" id="{E73D1FEA-6BDE-AB21-4649-4AF818EF0DBF}"/>
+                </a:ext>
+              </a:extLst>
+            </p:cNvPr>
+            <p:cNvSpPr txBox="1"/>
+            <p:nvPr/>
+          </p:nvSpPr>
+          <p:spPr>
+            <a:xfrm>
+              <a:off x="4523618" y="3912859"/>
+              <a:ext cx="1699881" cy="600164"/>
+            </a:xfrm>
+            <a:prstGeom prst="rect">
+              <a:avLst/>
+            </a:prstGeom>
+            <a:noFill/>
+          </p:spPr>
+          <p:txBody>
+            <a:bodyPr wrap="square" rtlCol="0">
+              <a:spAutoFit/>
+            </a:bodyPr>
+            <a:lstStyle/>
+            <a:p>
+              <a:pPr algn="ctr"/>
+              <a:r>
+                <a:rPr lang="pt-BR" sz="1100" dirty="0"/>
+                <a:t>Processa as planilhas </a:t>
+              </a:r>
+              <a:r>
+                <a:rPr lang="pt-BR" sz="1100" dirty="0" err="1"/>
+                <a:t>xlsx</a:t>
+              </a:r>
+              <a:r>
+                <a:rPr lang="pt-BR" sz="1100" dirty="0"/>
+                <a:t> do controle de estoque do ferro velho</a:t>
+              </a:r>
+            </a:p>
+          </p:txBody>
+        </p:sp>
+      </p:grpSp>
+      <p:cxnSp>
+        <p:nvCxnSpPr>
+          <p:cNvPr id="92" name="Straight Arrow Connector 91">
+            <a:extLst>
+              <a:ext uri="{FF2B5EF4-FFF2-40B4-BE49-F238E27FC236}">
+                <a16:creationId xmlns:a16="http://schemas.microsoft.com/office/drawing/2014/main" id="{CB474522-9A46-A6B2-4CDD-A1F8E1C0B001}"/>
+              </a:ext>
+            </a:extLst>
+          </p:cNvPr>
+          <p:cNvCxnSpPr>
+            <a:cxnSpLocks/>
+            <a:stCxn id="31" idx="3"/>
+            <a:endCxn id="22" idx="1"/>
+          </p:cNvCxnSpPr>
+          <p:nvPr/>
+        </p:nvCxnSpPr>
+        <p:spPr>
+          <a:xfrm flipV="1">
+            <a:off x="6180965" y="2230247"/>
+            <a:ext cx="480426" cy="8779"/>
+          </a:xfrm>
+          <a:prstGeom prst="straightConnector1">
+            <a:avLst/>
+          </a:prstGeom>
+          <a:ln>
+            <a:solidFill>
+              <a:schemeClr val="tx1"/>
+            </a:solidFill>
+            <a:prstDash val="lgDash"/>
+            <a:tailEnd type="triangle"/>
+          </a:ln>
+        </p:spPr>
+        <p:style>
+          <a:lnRef idx="2">
+            <a:schemeClr val="accent1"/>
+          </a:lnRef>
+          <a:fillRef idx="0">
+            <a:schemeClr val="accent1"/>
+          </a:fillRef>
+          <a:effectRef idx="1">
+            <a:schemeClr val="accent1"/>
+          </a:effectRef>
+          <a:fontRef idx="minor">
+            <a:schemeClr val="tx1"/>
+          </a:fontRef>
+        </p:style>
+      </p:cxnSp>
+      <p:cxnSp>
+        <p:nvCxnSpPr>
+          <p:cNvPr id="95" name="Straight Arrow Connector 94">
+            <a:extLst>
+              <a:ext uri="{FF2B5EF4-FFF2-40B4-BE49-F238E27FC236}">
+                <a16:creationId xmlns:a16="http://schemas.microsoft.com/office/drawing/2014/main" id="{A033EB39-25AB-8019-43F7-10479F265B23}"/>
+              </a:ext>
+            </a:extLst>
+          </p:cNvPr>
+          <p:cNvCxnSpPr>
+            <a:cxnSpLocks/>
+            <a:stCxn id="31" idx="2"/>
+            <a:endCxn id="70" idx="0"/>
+          </p:cNvCxnSpPr>
+          <p:nvPr/>
+        </p:nvCxnSpPr>
+        <p:spPr>
+          <a:xfrm flipH="1">
+            <a:off x="5293864" y="2889900"/>
+            <a:ext cx="2018" cy="572659"/>
+          </a:xfrm>
+          <a:prstGeom prst="straightConnector1">
+            <a:avLst/>
+          </a:prstGeom>
+          <a:ln>
+            <a:solidFill>
+              <a:schemeClr val="tx1"/>
+            </a:solidFill>
+            <a:prstDash val="lgDash"/>
+            <a:tailEnd type="triangle"/>
+          </a:ln>
+        </p:spPr>
+        <p:style>
+          <a:lnRef idx="2">
+            <a:schemeClr val="accent1"/>
+          </a:lnRef>
+          <a:fillRef idx="0">
+            <a:schemeClr val="accent1"/>
+          </a:fillRef>
+          <a:effectRef idx="1">
+            <a:schemeClr val="accent1"/>
+          </a:effectRef>
+          <a:fontRef idx="minor">
+            <a:schemeClr val="tx1"/>
+          </a:fontRef>
+        </p:style>
+      </p:cxnSp>
     </p:spTree>
     <p:extLst>
       <p:ext uri="{BB962C8B-B14F-4D97-AF65-F5344CB8AC3E}">

</xml_diff>